<commit_message>
update presentation, added pdf version
</commit_message>
<xml_diff>
--- a/Presentazione.pptx
+++ b/Presentazione.pptx
@@ -28,42 +28,39 @@
     <p:sldId id="306" r:id="rId19"/>
   </p:sldIdLst>
   <p:sldSz cx="9144000" cy="5143500" type="screen16x9"/>
-  <p:notesSz cx="6858000" cy="9144000"/>
+  <p:notesSz cx="7104063" cy="10234613"/>
   <p:embeddedFontLst>
     <p:embeddedFont>
-      <p:font typeface="Fira Sans SemiBold" panose="020B0604020202020204" charset="0"/>
+      <p:font typeface="Cascadia Code" panose="020B0609020000020004" pitchFamily="49" charset="0"/>
       <p:regular r:id="rId21"/>
       <p:bold r:id="rId22"/>
       <p:italic r:id="rId23"/>
       <p:boldItalic r:id="rId24"/>
     </p:embeddedFont>
     <p:embeddedFont>
-      <p:font typeface="Fira Sans" panose="020B0604020202020204" charset="0"/>
+      <p:font typeface="Fira Sans" panose="020B0503050000020004" pitchFamily="34" charset="0"/>
       <p:regular r:id="rId25"/>
       <p:bold r:id="rId26"/>
       <p:italic r:id="rId27"/>
       <p:boldItalic r:id="rId28"/>
     </p:embeddedFont>
     <p:embeddedFont>
-      <p:font typeface="Calibri" panose="020F0502020204030204" pitchFamily="34" charset="0"/>
+      <p:font typeface="Fira Sans Light" panose="020B0403050000020004" pitchFamily="34" charset="0"/>
       <p:regular r:id="rId29"/>
       <p:bold r:id="rId30"/>
       <p:italic r:id="rId31"/>
       <p:boldItalic r:id="rId32"/>
     </p:embeddedFont>
     <p:embeddedFont>
-      <p:font typeface="Fira Sans Light" panose="020B0604020202020204" charset="0"/>
+      <p:font typeface="Fira Sans SemiBold" panose="020B0603050000020004" pitchFamily="34" charset="0"/>
       <p:regular r:id="rId33"/>
       <p:bold r:id="rId34"/>
       <p:italic r:id="rId35"/>
       <p:boldItalic r:id="rId36"/>
     </p:embeddedFont>
     <p:embeddedFont>
-      <p:font typeface="Cascadia Code" panose="020B0609020000020004" pitchFamily="49" charset="0"/>
-      <p:regular r:id="rId37"/>
-      <p:bold r:id="rId38"/>
-      <p:italic r:id="rId39"/>
-      <p:boldItalic r:id="rId40"/>
+      <p:font typeface="Roboto Slab" pitchFamily="2" charset="0"/>
+      <p:bold r:id="rId37"/>
     </p:embeddedFont>
   </p:embeddedFontLst>
   <p:defaultTextStyle>
@@ -337,8 +334,8 @@
         </p:nvSpPr>
         <p:spPr>
           <a:xfrm>
-            <a:off x="381175" y="685800"/>
-            <a:ext cx="6096300" cy="3429000"/>
+            <a:off x="142875" y="768350"/>
+            <a:ext cx="6819900" cy="3836988"/>
           </a:xfrm>
           <a:custGeom>
             <a:avLst/>
@@ -388,8 +385,8 @@
         </p:nvSpPr>
         <p:spPr>
           <a:xfrm>
-            <a:off x="685800" y="4343400"/>
-            <a:ext cx="5486400" cy="4114800"/>
+            <a:off x="710407" y="4861441"/>
+            <a:ext cx="5683250" cy="4605576"/>
           </a:xfrm>
           <a:prstGeom prst="rect">
             <a:avLst/>
@@ -400,7 +397,7 @@
           </a:ln>
         </p:spPr>
         <p:txBody>
-          <a:bodyPr spcFirstLastPara="1" wrap="square" lIns="91425" tIns="91425" rIns="91425" bIns="91425" anchor="t" anchorCtr="0">
+          <a:bodyPr spcFirstLastPara="1" wrap="square" lIns="99059" tIns="99059" rIns="99059" bIns="99059" anchor="t" anchorCtr="0">
             <a:noAutofit/>
           </a:bodyPr>
           <a:lstStyle>
@@ -773,8 +770,8 @@
         </p:nvSpPr>
         <p:spPr>
           <a:xfrm>
-            <a:off x="381000" y="685800"/>
-            <a:ext cx="6096000" cy="3429000"/>
+            <a:off x="142875" y="768350"/>
+            <a:ext cx="6818313" cy="3836988"/>
           </a:xfrm>
           <a:custGeom>
             <a:avLst/>
@@ -814,26 +811,20 @@
         </p:nvSpPr>
         <p:spPr>
           <a:xfrm>
-            <a:off x="685800" y="4343400"/>
-            <a:ext cx="5486400" cy="4114800"/>
+            <a:off x="710407" y="4861441"/>
+            <a:ext cx="5683250" cy="4605576"/>
           </a:xfrm>
           <a:prstGeom prst="rect">
             <a:avLst/>
           </a:prstGeom>
         </p:spPr>
         <p:txBody>
-          <a:bodyPr spcFirstLastPara="1" wrap="square" lIns="91425" tIns="91425" rIns="91425" bIns="91425" anchor="t" anchorCtr="0">
+          <a:bodyPr spcFirstLastPara="1" wrap="square" lIns="99059" tIns="99059" rIns="99059" bIns="99059" anchor="t" anchorCtr="0">
             <a:noAutofit/>
           </a:bodyPr>
           <a:lstStyle/>
           <a:p>
-            <a:pPr marL="0" lvl="0" indent="0" algn="l" rtl="0">
-              <a:spcBef>
-                <a:spcPts val="0"/>
-              </a:spcBef>
-              <a:spcAft>
-                <a:spcPts val="0"/>
-              </a:spcAft>
+            <a:pPr marL="0" indent="0">
               <a:buNone/>
             </a:pPr>
             <a:endParaRPr/>
@@ -877,8 +868,8 @@
         </p:nvSpPr>
         <p:spPr>
           <a:xfrm>
-            <a:off x="381000" y="685800"/>
-            <a:ext cx="6096000" cy="3429000"/>
+            <a:off x="142875" y="768350"/>
+            <a:ext cx="6818313" cy="3836988"/>
           </a:xfrm>
           <a:custGeom>
             <a:avLst/>
@@ -918,26 +909,20 @@
         </p:nvSpPr>
         <p:spPr>
           <a:xfrm>
-            <a:off x="685800" y="4343400"/>
-            <a:ext cx="5486400" cy="4114800"/>
+            <a:off x="710407" y="4861441"/>
+            <a:ext cx="5683250" cy="4605576"/>
           </a:xfrm>
           <a:prstGeom prst="rect">
             <a:avLst/>
           </a:prstGeom>
         </p:spPr>
         <p:txBody>
-          <a:bodyPr spcFirstLastPara="1" wrap="square" lIns="91425" tIns="91425" rIns="91425" bIns="91425" anchor="t" anchorCtr="0">
+          <a:bodyPr spcFirstLastPara="1" wrap="square" lIns="99059" tIns="99059" rIns="99059" bIns="99059" anchor="t" anchorCtr="0">
             <a:noAutofit/>
           </a:bodyPr>
           <a:lstStyle/>
           <a:p>
-            <a:pPr marL="0" lvl="0" indent="0" algn="l" rtl="0">
-              <a:spcBef>
-                <a:spcPts val="0"/>
-              </a:spcBef>
-              <a:spcAft>
-                <a:spcPts val="0"/>
-              </a:spcAft>
+            <a:pPr marL="0" indent="0">
               <a:buNone/>
             </a:pPr>
             <a:endParaRPr/>
@@ -986,8 +971,8 @@
         </p:nvSpPr>
         <p:spPr>
           <a:xfrm>
-            <a:off x="381000" y="685800"/>
-            <a:ext cx="6096000" cy="3429000"/>
+            <a:off x="142875" y="768350"/>
+            <a:ext cx="6818313" cy="3836988"/>
           </a:xfrm>
           <a:custGeom>
             <a:avLst/>
@@ -1027,26 +1012,20 @@
         </p:nvSpPr>
         <p:spPr>
           <a:xfrm>
-            <a:off x="685800" y="4343400"/>
-            <a:ext cx="5486400" cy="4114800"/>
+            <a:off x="710407" y="4861441"/>
+            <a:ext cx="5683250" cy="4605576"/>
           </a:xfrm>
           <a:prstGeom prst="rect">
             <a:avLst/>
           </a:prstGeom>
         </p:spPr>
         <p:txBody>
-          <a:bodyPr spcFirstLastPara="1" wrap="square" lIns="91425" tIns="91425" rIns="91425" bIns="91425" anchor="t" anchorCtr="0">
+          <a:bodyPr spcFirstLastPara="1" wrap="square" lIns="99059" tIns="99059" rIns="99059" bIns="99059" anchor="t" anchorCtr="0">
             <a:noAutofit/>
           </a:bodyPr>
           <a:lstStyle/>
           <a:p>
-            <a:pPr marL="0" lvl="0" indent="0" algn="l" rtl="0">
-              <a:spcBef>
-                <a:spcPts val="0"/>
-              </a:spcBef>
-              <a:spcAft>
-                <a:spcPts val="0"/>
-              </a:spcAft>
+            <a:pPr marL="0" indent="0">
               <a:buNone/>
             </a:pPr>
             <a:endParaRPr/>
@@ -1095,8 +1074,8 @@
         </p:nvSpPr>
         <p:spPr>
           <a:xfrm>
-            <a:off x="381000" y="685800"/>
-            <a:ext cx="6096000" cy="3429000"/>
+            <a:off x="142875" y="768350"/>
+            <a:ext cx="6818313" cy="3836988"/>
           </a:xfrm>
           <a:custGeom>
             <a:avLst/>
@@ -1136,26 +1115,20 @@
         </p:nvSpPr>
         <p:spPr>
           <a:xfrm>
-            <a:off x="685800" y="4343400"/>
-            <a:ext cx="5486400" cy="4114800"/>
+            <a:off x="710407" y="4861441"/>
+            <a:ext cx="5683250" cy="4605576"/>
           </a:xfrm>
           <a:prstGeom prst="rect">
             <a:avLst/>
           </a:prstGeom>
         </p:spPr>
         <p:txBody>
-          <a:bodyPr spcFirstLastPara="1" wrap="square" lIns="91425" tIns="91425" rIns="91425" bIns="91425" anchor="t" anchorCtr="0">
+          <a:bodyPr spcFirstLastPara="1" wrap="square" lIns="99059" tIns="99059" rIns="99059" bIns="99059" anchor="t" anchorCtr="0">
             <a:noAutofit/>
           </a:bodyPr>
           <a:lstStyle/>
           <a:p>
-            <a:pPr marL="0" lvl="0" indent="0" algn="l" rtl="0">
-              <a:spcBef>
-                <a:spcPts val="0"/>
-              </a:spcBef>
-              <a:spcAft>
-                <a:spcPts val="0"/>
-              </a:spcAft>
+            <a:pPr marL="0" indent="0">
               <a:buNone/>
             </a:pPr>
             <a:endParaRPr/>
@@ -1204,8 +1177,8 @@
         </p:nvSpPr>
         <p:spPr>
           <a:xfrm>
-            <a:off x="381000" y="685800"/>
-            <a:ext cx="6096000" cy="3429000"/>
+            <a:off x="142875" y="768350"/>
+            <a:ext cx="6818313" cy="3836988"/>
           </a:xfrm>
           <a:custGeom>
             <a:avLst/>
@@ -1245,26 +1218,20 @@
         </p:nvSpPr>
         <p:spPr>
           <a:xfrm>
-            <a:off x="685800" y="4343400"/>
-            <a:ext cx="5486400" cy="4114800"/>
+            <a:off x="710407" y="4861441"/>
+            <a:ext cx="5683250" cy="4605576"/>
           </a:xfrm>
           <a:prstGeom prst="rect">
             <a:avLst/>
           </a:prstGeom>
         </p:spPr>
         <p:txBody>
-          <a:bodyPr spcFirstLastPara="1" wrap="square" lIns="91425" tIns="91425" rIns="91425" bIns="91425" anchor="t" anchorCtr="0">
+          <a:bodyPr spcFirstLastPara="1" wrap="square" lIns="99059" tIns="99059" rIns="99059" bIns="99059" anchor="t" anchorCtr="0">
             <a:noAutofit/>
           </a:bodyPr>
           <a:lstStyle/>
           <a:p>
-            <a:pPr marL="0" lvl="0" indent="0" algn="l" rtl="0">
-              <a:spcBef>
-                <a:spcPts val="0"/>
-              </a:spcBef>
-              <a:spcAft>
-                <a:spcPts val="0"/>
-              </a:spcAft>
+            <a:pPr marL="0" indent="0">
               <a:buNone/>
             </a:pPr>
             <a:endParaRPr/>
@@ -1313,8 +1280,8 @@
         </p:nvSpPr>
         <p:spPr>
           <a:xfrm>
-            <a:off x="381000" y="685800"/>
-            <a:ext cx="6096000" cy="3429000"/>
+            <a:off x="142875" y="768350"/>
+            <a:ext cx="6818313" cy="3836988"/>
           </a:xfrm>
           <a:custGeom>
             <a:avLst/>
@@ -1354,26 +1321,20 @@
         </p:nvSpPr>
         <p:spPr>
           <a:xfrm>
-            <a:off x="685800" y="4343400"/>
-            <a:ext cx="5486400" cy="4114800"/>
+            <a:off x="710407" y="4861441"/>
+            <a:ext cx="5683250" cy="4605576"/>
           </a:xfrm>
           <a:prstGeom prst="rect">
             <a:avLst/>
           </a:prstGeom>
         </p:spPr>
         <p:txBody>
-          <a:bodyPr spcFirstLastPara="1" wrap="square" lIns="91425" tIns="91425" rIns="91425" bIns="91425" anchor="t" anchorCtr="0">
+          <a:bodyPr spcFirstLastPara="1" wrap="square" lIns="99059" tIns="99059" rIns="99059" bIns="99059" anchor="t" anchorCtr="0">
             <a:noAutofit/>
           </a:bodyPr>
           <a:lstStyle/>
           <a:p>
-            <a:pPr marL="0" lvl="0" indent="0" algn="l" rtl="0">
-              <a:spcBef>
-                <a:spcPts val="0"/>
-              </a:spcBef>
-              <a:spcAft>
-                <a:spcPts val="0"/>
-              </a:spcAft>
+            <a:pPr marL="0" indent="0">
               <a:buNone/>
             </a:pPr>
             <a:endParaRPr/>
@@ -1422,8 +1383,8 @@
         </p:nvSpPr>
         <p:spPr>
           <a:xfrm>
-            <a:off x="381000" y="685800"/>
-            <a:ext cx="6096000" cy="3429000"/>
+            <a:off x="142875" y="768350"/>
+            <a:ext cx="6818313" cy="3836988"/>
           </a:xfrm>
           <a:custGeom>
             <a:avLst/>
@@ -1463,26 +1424,20 @@
         </p:nvSpPr>
         <p:spPr>
           <a:xfrm>
-            <a:off x="685800" y="4343400"/>
-            <a:ext cx="5486400" cy="4114800"/>
+            <a:off x="710407" y="4861441"/>
+            <a:ext cx="5683250" cy="4605576"/>
           </a:xfrm>
           <a:prstGeom prst="rect">
             <a:avLst/>
           </a:prstGeom>
         </p:spPr>
         <p:txBody>
-          <a:bodyPr spcFirstLastPara="1" wrap="square" lIns="91425" tIns="91425" rIns="91425" bIns="91425" anchor="t" anchorCtr="0">
+          <a:bodyPr spcFirstLastPara="1" wrap="square" lIns="99059" tIns="99059" rIns="99059" bIns="99059" anchor="t" anchorCtr="0">
             <a:noAutofit/>
           </a:bodyPr>
           <a:lstStyle/>
           <a:p>
-            <a:pPr marL="0" lvl="0" indent="0" algn="l" rtl="0">
-              <a:spcBef>
-                <a:spcPts val="0"/>
-              </a:spcBef>
-              <a:spcAft>
-                <a:spcPts val="0"/>
-              </a:spcAft>
+            <a:pPr marL="0" indent="0">
               <a:buNone/>
             </a:pPr>
             <a:endParaRPr dirty="0"/>
@@ -7488,21 +7443,21 @@
           <a:p>
             <a:pPr lvl="0" algn="ctr"/>
             <a:r>
-              <a:rPr lang="it-IT" sz="3600" cap="small" dirty="0" smtClean="0"/>
+              <a:rPr lang="it-IT" sz="3600" cap="small" dirty="0"/>
               <a:t>INIEZIONE AUTOMATIZZATA DI VULNERABILITÀ</a:t>
             </a:r>
             <a:br>
-              <a:rPr lang="it-IT" sz="3600" cap="small" dirty="0" smtClean="0"/>
+              <a:rPr lang="it-IT" sz="3600" cap="small" dirty="0"/>
             </a:br>
             <a:r>
-              <a:rPr lang="it-IT" sz="3600" cap="small" dirty="0" smtClean="0"/>
+              <a:rPr lang="it-IT" sz="3600" cap="small" dirty="0"/>
               <a:t>MASS ASSIGNMENT IN </a:t>
             </a:r>
             <a:br>
-              <a:rPr lang="it-IT" sz="3600" cap="small" dirty="0" smtClean="0"/>
+              <a:rPr lang="it-IT" sz="3600" cap="small" dirty="0"/>
             </a:br>
             <a:r>
-              <a:rPr lang="it-IT" sz="3600" cap="small" dirty="0" smtClean="0"/>
+              <a:rPr lang="it-IT" sz="3600" cap="small" dirty="0"/>
               <a:t>REST API</a:t>
             </a:r>
             <a:endParaRPr sz="3600" dirty="0"/>
@@ -7514,13 +7469,6 @@
   <p:clrMapOvr>
     <a:masterClrMapping/>
   </p:clrMapOvr>
-  <p:timing>
-    <p:tnLst>
-      <p:par>
-        <p:cTn id="1" dur="indefinite" restart="never" nodeType="tmRoot"/>
-      </p:par>
-    </p:tnLst>
-  </p:timing>
 </p:sld>
 </file>
 
@@ -7576,7 +7524,7 @@
               <a:buNone/>
             </a:pPr>
             <a:r>
-              <a:rPr lang="en" dirty="0" smtClean="0"/>
+              <a:rPr lang="en" dirty="0"/>
               <a:t>Iniezione di vulnerabilità</a:t>
             </a:r>
             <a:endParaRPr dirty="0"/>
@@ -7654,13 +7602,6 @@
   <p:clrMapOvr>
     <a:masterClrMapping/>
   </p:clrMapOvr>
-  <p:timing>
-    <p:tnLst>
-      <p:par>
-        <p:cTn id="1" dur="indefinite" restart="never" nodeType="tmRoot"/>
-      </p:par>
-    </p:tnLst>
-  </p:timing>
 </p:sld>
 </file>
 
@@ -7697,10 +7638,9 @@
           <a:lstStyle/>
           <a:p>
             <a:r>
-              <a:rPr lang="it-IT" dirty="0" smtClean="0"/>
+              <a:rPr lang="it-IT" dirty="0"/>
               <a:t>Processo di iniezione automatizzata</a:t>
             </a:r>
-            <a:endParaRPr lang="it-IT" dirty="0"/>
           </a:p>
         </p:txBody>
       </p:sp>
@@ -7789,7 +7729,7 @@
           <a:lstStyle/>
           <a:p>
             <a:r>
-              <a:rPr lang="it-IT" sz="1200" dirty="0" smtClean="0">
+              <a:rPr lang="it-IT" sz="1200" dirty="0">
                 <a:latin typeface="Cascadia Code" panose="020B0609020000020004" pitchFamily="49" charset="0"/>
                 <a:cs typeface="Cascadia Code" panose="020B0609020000020004" pitchFamily="49" charset="0"/>
               </a:rPr>
@@ -7798,7 +7738,7 @@
           </a:p>
           <a:p>
             <a:r>
-              <a:rPr lang="it-IT" sz="1200" dirty="0" smtClean="0">
+              <a:rPr lang="it-IT" sz="1200" dirty="0">
                 <a:latin typeface="Cascadia Code" panose="020B0609020000020004" pitchFamily="49" charset="0"/>
                 <a:cs typeface="Cascadia Code" panose="020B0609020000020004" pitchFamily="49" charset="0"/>
               </a:rPr>
@@ -7826,7 +7766,7 @@
               <a:t>HttpStatus.OK</a:t>
             </a:r>
             <a:r>
-              <a:rPr lang="it-IT" sz="1200" dirty="0" smtClean="0">
+              <a:rPr lang="it-IT" sz="1200" dirty="0">
                 <a:latin typeface="Cascadia Code" panose="020B0609020000020004" pitchFamily="49" charset="0"/>
                 <a:cs typeface="Cascadia Code" panose="020B0609020000020004" pitchFamily="49" charset="0"/>
               </a:rPr>
@@ -7835,18 +7775,11 @@
           </a:p>
           <a:p>
             <a:r>
-              <a:rPr lang="it-IT" sz="1200" dirty="0" smtClean="0">
-                <a:latin typeface="Cascadia Code" panose="020B0609020000020004" pitchFamily="49" charset="0"/>
-                <a:cs typeface="Cascadia Code" panose="020B0609020000020004" pitchFamily="49" charset="0"/>
-              </a:rPr>
-              <a:t>@</a:t>
-            </a:r>
-            <a:r>
               <a:rPr lang="it-IT" sz="1200" dirty="0">
                 <a:latin typeface="Cascadia Code" panose="020B0609020000020004" pitchFamily="49" charset="0"/>
                 <a:cs typeface="Cascadia Code" panose="020B0609020000020004" pitchFamily="49" charset="0"/>
               </a:rPr>
-              <a:t>Post(’</a:t>
+              <a:t>@Post(’</a:t>
             </a:r>
             <a:r>
               <a:rPr lang="it-IT" sz="1200" dirty="0" err="1">
@@ -7891,14 +7824,14 @@
               <a:t>: </a:t>
             </a:r>
             <a:r>
-              <a:rPr lang="it-IT" sz="1200" dirty="0" err="1" smtClean="0">
+              <a:rPr lang="it-IT" sz="1200" dirty="0" err="1">
                 <a:latin typeface="Cascadia Code" panose="020B0609020000020004" pitchFamily="49" charset="0"/>
                 <a:cs typeface="Cascadia Code" panose="020B0609020000020004" pitchFamily="49" charset="0"/>
               </a:rPr>
               <a:t>CreateUserDto</a:t>
             </a:r>
             <a:r>
-              <a:rPr lang="it-IT" sz="1200" dirty="0" smtClean="0">
+              <a:rPr lang="it-IT" sz="1200" dirty="0">
                 <a:latin typeface="Cascadia Code" panose="020B0609020000020004" pitchFamily="49" charset="0"/>
                 <a:cs typeface="Cascadia Code" panose="020B0609020000020004" pitchFamily="49" charset="0"/>
               </a:rPr>
@@ -7907,21 +7840,21 @@
           </a:p>
           <a:p>
             <a:r>
-              <a:rPr lang="it-IT" sz="1200" dirty="0" smtClean="0">
+              <a:rPr lang="it-IT" sz="1200" dirty="0">
                 <a:latin typeface="Cascadia Code" panose="020B0609020000020004" pitchFamily="49" charset="0"/>
                 <a:cs typeface="Cascadia Code" panose="020B0609020000020004" pitchFamily="49" charset="0"/>
               </a:rPr>
               <a:t>    </a:t>
             </a:r>
             <a:r>
-              <a:rPr lang="it-IT" sz="1200" dirty="0" err="1" smtClean="0">
+              <a:rPr lang="it-IT" sz="1200" dirty="0" err="1">
                 <a:latin typeface="Cascadia Code" panose="020B0609020000020004" pitchFamily="49" charset="0"/>
                 <a:cs typeface="Cascadia Code" panose="020B0609020000020004" pitchFamily="49" charset="0"/>
               </a:rPr>
               <a:t>return</a:t>
             </a:r>
             <a:r>
-              <a:rPr lang="it-IT" sz="1200" dirty="0" smtClean="0">
+              <a:rPr lang="it-IT" sz="1200" dirty="0">
                 <a:latin typeface="Cascadia Code" panose="020B0609020000020004" pitchFamily="49" charset="0"/>
                 <a:cs typeface="Cascadia Code" panose="020B0609020000020004" pitchFamily="49" charset="0"/>
               </a:rPr>
@@ -7949,7 +7882,7 @@
               <a:t>signUpDto</a:t>
             </a:r>
             <a:r>
-              <a:rPr lang="it-IT" sz="1200" dirty="0" smtClean="0">
+              <a:rPr lang="it-IT" sz="1200" dirty="0">
                 <a:latin typeface="Cascadia Code" panose="020B0609020000020004" pitchFamily="49" charset="0"/>
                 <a:cs typeface="Cascadia Code" panose="020B0609020000020004" pitchFamily="49" charset="0"/>
               </a:rPr>
@@ -7958,7 +7891,7 @@
           </a:p>
           <a:p>
             <a:r>
-              <a:rPr lang="it-IT" sz="1200" dirty="0" smtClean="0">
+              <a:rPr lang="it-IT" sz="1200" dirty="0">
                 <a:latin typeface="Cascadia Code" panose="020B0609020000020004" pitchFamily="49" charset="0"/>
                 <a:cs typeface="Cascadia Code" panose="020B0609020000020004" pitchFamily="49" charset="0"/>
               </a:rPr>
@@ -7967,7 +7900,7 @@
           </a:p>
           <a:p>
             <a:r>
-              <a:rPr lang="it-IT" sz="1200" dirty="0" smtClean="0">
+              <a:rPr lang="it-IT" sz="1200" dirty="0">
                 <a:latin typeface="Cascadia Code" panose="020B0609020000020004" pitchFamily="49" charset="0"/>
                 <a:cs typeface="Cascadia Code" panose="020B0609020000020004" pitchFamily="49" charset="0"/>
               </a:rPr>
@@ -8093,23 +8026,19 @@
           <a:lstStyle/>
           <a:p>
             <a:r>
-              <a:rPr lang="it-IT" sz="1200" dirty="0" err="1" smtClean="0">
+              <a:rPr lang="it-IT" sz="1200" dirty="0" err="1">
                 <a:latin typeface="Cascadia Code" panose="020B0609020000020004" pitchFamily="49" charset="0"/>
                 <a:cs typeface="Cascadia Code" panose="020B0609020000020004" pitchFamily="49" charset="0"/>
               </a:rPr>
               <a:t>any</a:t>
             </a:r>
             <a:r>
-              <a:rPr lang="it-IT" sz="1200" dirty="0" smtClean="0">
+              <a:rPr lang="it-IT" sz="1200" dirty="0">
                 <a:latin typeface="Cascadia Code" panose="020B0609020000020004" pitchFamily="49" charset="0"/>
                 <a:cs typeface="Cascadia Code" panose="020B0609020000020004" pitchFamily="49" charset="0"/>
               </a:rPr>
               <a:t> ) {</a:t>
             </a:r>
-            <a:endParaRPr lang="it-IT" sz="1200" dirty="0">
-              <a:latin typeface="Cascadia Code" panose="020B0609020000020004" pitchFamily="49" charset="0"/>
-              <a:cs typeface="Cascadia Code" panose="020B0609020000020004" pitchFamily="49" charset="0"/>
-            </a:endParaRPr>
           </a:p>
         </p:txBody>
       </p:sp>
@@ -8426,7 +8355,7 @@
               <a:buNone/>
             </a:pPr>
             <a:r>
-              <a:rPr lang="en" dirty="0" smtClean="0"/>
+              <a:rPr lang="en" dirty="0"/>
               <a:t>Validazione sperimentale</a:t>
             </a:r>
             <a:endParaRPr dirty="0"/>
@@ -8504,13 +8433,6 @@
   <p:clrMapOvr>
     <a:masterClrMapping/>
   </p:clrMapOvr>
-  <p:timing>
-    <p:tnLst>
-      <p:par>
-        <p:cTn id="1" dur="indefinite" restart="never" nodeType="tmRoot"/>
-      </p:par>
-    </p:tnLst>
-  </p:timing>
 </p:sld>
 </file>
 
@@ -8547,10 +8469,9 @@
           <a:lstStyle/>
           <a:p>
             <a:r>
-              <a:rPr lang="it-IT" dirty="0" smtClean="0"/>
+              <a:rPr lang="it-IT" dirty="0"/>
               <a:t>Quesiti di ricerca</a:t>
             </a:r>
-            <a:endParaRPr lang="it-IT" dirty="0"/>
           </a:p>
         </p:txBody>
       </p:sp>
@@ -8570,35 +8491,29 @@
           <a:lstStyle/>
           <a:p>
             <a:r>
-              <a:rPr lang="it-IT" sz="1800" b="1" dirty="0" smtClean="0">
+              <a:rPr lang="it-IT" sz="1800" b="1" dirty="0">
                 <a:latin typeface="Fira Sans" panose="020B0604020202020204" charset="0"/>
               </a:rPr>
               <a:t>QR1: </a:t>
             </a:r>
             <a:r>
               <a:rPr lang="it-IT" sz="1800" dirty="0">
-                <a:latin typeface="Fira Sans" panose="020B0604020202020204" charset="0"/>
+                <a:latin typeface="Fira Sans Light" panose="020B0403050000020004" pitchFamily="34" charset="0"/>
               </a:rPr>
-              <a:t>Sono stati effettivamente iniettati tutti i punti potenzialmente vulnerabili</a:t>
-            </a:r>
-            <a:r>
-              <a:rPr lang="it-IT" sz="1800" dirty="0" smtClean="0">
-                <a:latin typeface="Fira Sans" panose="020B0604020202020204" charset="0"/>
-              </a:rPr>
-              <a:t>?</a:t>
+              <a:t>Sono stati effettivamente iniettati tutti i punti potenzialmente vulnerabili?</a:t>
             </a:r>
             <a:br>
-              <a:rPr lang="it-IT" sz="1800" dirty="0" smtClean="0">
+              <a:rPr lang="it-IT" sz="1800" dirty="0">
                 <a:latin typeface="Fira Sans" panose="020B0604020202020204" charset="0"/>
               </a:rPr>
             </a:br>
-            <a:endParaRPr lang="it-IT" sz="1800" dirty="0" smtClean="0">
+            <a:endParaRPr lang="it-IT" sz="1800" dirty="0">
               <a:latin typeface="Fira Sans" panose="020B0604020202020204" charset="0"/>
             </a:endParaRPr>
           </a:p>
           <a:p>
             <a:r>
-              <a:rPr lang="it-IT" sz="1800" b="1" dirty="0" smtClean="0">
+              <a:rPr lang="it-IT" sz="1800" b="1" dirty="0">
                 <a:latin typeface="Fira Sans" panose="020B0604020202020204" charset="0"/>
               </a:rPr>
               <a:t>QR2: </a:t>
@@ -8612,30 +8527,25 @@
               <a:t>assignment</a:t>
             </a:r>
             <a:r>
-              <a:rPr lang="it-IT" sz="1800" dirty="0" smtClean="0"/>
+              <a:rPr lang="it-IT" sz="1800" dirty="0"/>
               <a:t>?</a:t>
             </a:r>
             <a:br>
-              <a:rPr lang="it-IT" sz="1800" dirty="0" smtClean="0"/>
+              <a:rPr lang="it-IT" sz="1800" dirty="0"/>
             </a:br>
-            <a:endParaRPr lang="it-IT" sz="1800" dirty="0" smtClean="0"/>
+            <a:endParaRPr lang="it-IT" sz="1800" dirty="0"/>
           </a:p>
           <a:p>
             <a:r>
-              <a:rPr lang="it-IT" sz="1800" b="1" dirty="0" smtClean="0">
+              <a:rPr lang="it-IT" sz="1800" b="1" dirty="0">
                 <a:latin typeface="Fira Sans" panose="020B0604020202020204" charset="0"/>
               </a:rPr>
               <a:t>QR3: </a:t>
             </a:r>
             <a:r>
               <a:rPr lang="it-IT" sz="1800" dirty="0"/>
-              <a:t>Il codice modificato rimane corretto da un punto di vista funzionale</a:t>
+              <a:t>Il codice modificato rimane corretto da un punto di vista funzionale?</a:t>
             </a:r>
-            <a:r>
-              <a:rPr lang="it-IT" sz="1800" dirty="0" smtClean="0"/>
-              <a:t>?</a:t>
-            </a:r>
-            <a:endParaRPr lang="it-IT" sz="1800" dirty="0"/>
           </a:p>
         </p:txBody>
       </p:sp>
@@ -8649,13 +8559,6 @@
   <p:clrMapOvr>
     <a:masterClrMapping/>
   </p:clrMapOvr>
-  <p:timing>
-    <p:tnLst>
-      <p:par>
-        <p:cTn id="1" dur="indefinite" restart="never" nodeType="tmRoot"/>
-      </p:par>
-    </p:tnLst>
-  </p:timing>
 </p:sld>
 </file>
 
@@ -8692,10 +8595,9 @@
           <a:lstStyle/>
           <a:p>
             <a:r>
-              <a:rPr lang="it-IT" dirty="0" smtClean="0"/>
+              <a:rPr lang="it-IT" dirty="0"/>
               <a:t>Setup sperimentale</a:t>
             </a:r>
-            <a:endParaRPr lang="it-IT" dirty="0"/>
           </a:p>
         </p:txBody>
       </p:sp>
@@ -8715,25 +8617,25 @@
           <a:lstStyle/>
           <a:p>
             <a:r>
-              <a:rPr lang="it-IT" sz="1400" dirty="0" smtClean="0"/>
+              <a:rPr lang="it-IT" sz="1400" dirty="0"/>
               <a:t>Scelti 9 casi di studio, 3 per ogni linguaggio e rispettivo </a:t>
             </a:r>
             <a:r>
-              <a:rPr lang="it-IT" sz="1400" dirty="0" err="1" smtClean="0"/>
+              <a:rPr lang="it-IT" sz="1400" dirty="0" err="1"/>
               <a:t>framework</a:t>
             </a:r>
             <a:r>
-              <a:rPr lang="it-IT" sz="1400" dirty="0" smtClean="0"/>
+              <a:rPr lang="it-IT" sz="1400" dirty="0"/>
               <a:t> di programmazione</a:t>
             </a:r>
             <a:br>
-              <a:rPr lang="it-IT" sz="1400" dirty="0" smtClean="0"/>
+              <a:rPr lang="it-IT" sz="1400" dirty="0"/>
             </a:br>
-            <a:endParaRPr lang="it-IT" sz="1400" dirty="0" smtClean="0"/>
+            <a:endParaRPr lang="it-IT" sz="1400" dirty="0"/>
           </a:p>
           <a:p>
             <a:r>
-              <a:rPr lang="it-IT" sz="1400" dirty="0" smtClean="0"/>
+              <a:rPr lang="it-IT" sz="1400" dirty="0"/>
               <a:t>Definite 3 metriche:</a:t>
             </a:r>
           </a:p>
@@ -8744,7 +8646,7 @@
               </a:lnSpc>
             </a:pPr>
             <a:r>
-              <a:rPr lang="it-IT" sz="1400" dirty="0" smtClean="0"/>
+              <a:rPr lang="it-IT" sz="1400" dirty="0"/>
               <a:t>Correttezza dell’identificazione dei pattern</a:t>
             </a:r>
           </a:p>
@@ -8755,7 +8657,7 @@
               </a:lnSpc>
             </a:pPr>
             <a:r>
-              <a:rPr lang="it-IT" sz="1400" dirty="0" smtClean="0"/>
+              <a:rPr lang="it-IT" sz="1400" dirty="0"/>
               <a:t>Correttezza dell’iniezione di vulnerabilità</a:t>
             </a:r>
           </a:p>
@@ -8766,7 +8668,7 @@
               </a:lnSpc>
             </a:pPr>
             <a:r>
-              <a:rPr lang="it-IT" sz="1400" dirty="0" smtClean="0"/>
+              <a:rPr lang="it-IT" sz="1400" dirty="0"/>
               <a:t>Validità delle API post iniezione</a:t>
             </a:r>
           </a:p>
@@ -8785,23 +8687,23 @@
               </a:lnSpc>
             </a:pPr>
             <a:r>
-              <a:rPr lang="it-IT" sz="1400" dirty="0" smtClean="0"/>
+              <a:rPr lang="it-IT" sz="1400" dirty="0"/>
               <a:t>Scelto un sottoinsieme di file per ogni caso di studio, analizzati prima e dopo l’esecuzione del </a:t>
             </a:r>
             <a:r>
-              <a:rPr lang="it-IT" sz="1400" dirty="0" err="1" smtClean="0"/>
+              <a:rPr lang="it-IT" sz="1400" dirty="0" err="1"/>
               <a:t>tool</a:t>
             </a:r>
             <a:r>
-              <a:rPr lang="it-IT" sz="1400" dirty="0" smtClean="0"/>
+              <a:rPr lang="it-IT" sz="1400" dirty="0"/>
               <a:t> insieme a stampe di </a:t>
             </a:r>
             <a:r>
-              <a:rPr lang="it-IT" sz="1400" dirty="0" err="1" smtClean="0"/>
+              <a:rPr lang="it-IT" sz="1400" dirty="0" err="1"/>
               <a:t>debug</a:t>
             </a:r>
             <a:r>
-              <a:rPr lang="it-IT" sz="1400" dirty="0" smtClean="0"/>
+              <a:rPr lang="it-IT" sz="1400" dirty="0"/>
               <a:t> preimpostate</a:t>
             </a:r>
           </a:p>
@@ -8849,13 +8751,6 @@
   <p:clrMapOvr>
     <a:masterClrMapping/>
   </p:clrMapOvr>
-  <p:timing>
-    <p:tnLst>
-      <p:par>
-        <p:cTn id="1" dur="indefinite" restart="never" nodeType="tmRoot"/>
-      </p:par>
-    </p:tnLst>
-  </p:timing>
 </p:sld>
 </file>
 
@@ -8892,10 +8787,9 @@
           <a:lstStyle/>
           <a:p>
             <a:r>
-              <a:rPr lang="it-IT" dirty="0" smtClean="0"/>
+              <a:rPr lang="it-IT" dirty="0"/>
               <a:t>Risultati</a:t>
             </a:r>
-            <a:endParaRPr lang="it-IT" dirty="0"/>
           </a:p>
         </p:txBody>
       </p:sp>
@@ -8915,58 +8809,18 @@
           <a:lstStyle/>
           <a:p>
             <a:r>
-              <a:rPr lang="it-IT" sz="1600" dirty="0" smtClean="0"/>
-              <a:t>Nei </a:t>
-            </a:r>
-            <a:r>
               <a:rPr lang="it-IT" sz="1600" dirty="0"/>
-              <a:t>casi in cui erano presenti punti potenzialmente iniettabili, lo </a:t>
-            </a:r>
-            <a:r>
-              <a:rPr lang="it-IT" sz="1600" dirty="0" smtClean="0"/>
-              <a:t>strumento </a:t>
-            </a:r>
-            <a:r>
-              <a:rPr lang="it-IT" sz="1600" dirty="0"/>
-              <a:t>ha identificato e modificato con successo la quasi </a:t>
-            </a:r>
-            <a:r>
-              <a:rPr lang="it-IT" sz="1600" dirty="0" smtClean="0"/>
-              <a:t>totalità </a:t>
-            </a:r>
-            <a:r>
-              <a:rPr lang="it-IT" sz="1600" dirty="0"/>
-              <a:t>dei casi, </a:t>
-            </a:r>
-            <a:r>
-              <a:rPr lang="it-IT" sz="1600" dirty="0" smtClean="0"/>
-              <a:t>41 </a:t>
-            </a:r>
-            <a:r>
-              <a:rPr lang="it-IT" sz="1600" dirty="0"/>
-              <a:t>casi identificati su 45 </a:t>
-            </a:r>
-            <a:r>
-              <a:rPr lang="it-IT" sz="1600" dirty="0" smtClean="0"/>
-              <a:t>potenziali</a:t>
+              <a:t>Nei casi in cui erano presenti punti potenzialmente iniettabili, lo strumento ha identificato e modificato con successo la quasi totalità dei casi, 41 casi identificati su 45 potenziali</a:t>
             </a:r>
             <a:br>
-              <a:rPr lang="it-IT" sz="1600" dirty="0" smtClean="0"/>
+              <a:rPr lang="it-IT" sz="1600" dirty="0"/>
             </a:br>
-            <a:endParaRPr lang="it-IT" sz="1600" dirty="0" smtClean="0"/>
+            <a:endParaRPr lang="it-IT" sz="1600" dirty="0"/>
           </a:p>
           <a:p>
             <a:r>
               <a:rPr lang="it-IT" sz="1600" dirty="0"/>
-              <a:t>L</a:t>
-            </a:r>
-            <a:r>
-              <a:rPr lang="it-IT" sz="1600" dirty="0" smtClean="0"/>
-              <a:t>a vulnerabilità </a:t>
-            </a:r>
-            <a:r>
-              <a:rPr lang="it-IT" sz="1600" dirty="0"/>
-              <a:t>di mass </a:t>
+              <a:t>La vulnerabilità di mass </a:t>
             </a:r>
             <a:r>
               <a:rPr lang="it-IT" sz="1600" dirty="0" err="1"/>
@@ -8974,24 +8828,12 @@
             </a:r>
             <a:r>
               <a:rPr lang="it-IT" sz="1600" dirty="0"/>
-              <a:t> è</a:t>
-            </a:r>
-            <a:r>
-              <a:rPr lang="it-IT" sz="1600" dirty="0" smtClean="0"/>
-              <a:t> </a:t>
-            </a:r>
-            <a:r>
-              <a:rPr lang="it-IT" sz="1600" dirty="0"/>
-              <a:t>stata correttamente introdotta da tutte le iniezioni </a:t>
-            </a:r>
-            <a:r>
-              <a:rPr lang="it-IT" sz="1600" dirty="0" smtClean="0"/>
-              <a:t>effettuate</a:t>
+              <a:t> è stata correttamente introdotta da tutte le iniezioni effettuate</a:t>
             </a:r>
             <a:br>
-              <a:rPr lang="it-IT" sz="1600" dirty="0" smtClean="0"/>
+              <a:rPr lang="it-IT" sz="1600" dirty="0"/>
             </a:br>
-            <a:endParaRPr lang="it-IT" sz="1600" dirty="0" smtClean="0"/>
+            <a:endParaRPr lang="it-IT" sz="1600" dirty="0"/>
           </a:p>
           <a:p>
             <a:r>
@@ -9043,13 +8885,6 @@
   <p:clrMapOvr>
     <a:masterClrMapping/>
   </p:clrMapOvr>
-  <p:timing>
-    <p:tnLst>
-      <p:par>
-        <p:cTn id="1" dur="indefinite" restart="never" nodeType="tmRoot"/>
-      </p:par>
-    </p:tnLst>
-  </p:timing>
 </p:sld>
 </file>
 
@@ -9086,10 +8921,9 @@
           <a:lstStyle/>
           <a:p>
             <a:r>
-              <a:rPr lang="it-IT" dirty="0" smtClean="0"/>
+              <a:rPr lang="it-IT" dirty="0"/>
               <a:t>Risposte ai quesiti di ricerca</a:t>
             </a:r>
-            <a:endParaRPr lang="it-IT" dirty="0"/>
           </a:p>
         </p:txBody>
       </p:sp>
@@ -9109,37 +8943,27 @@
           <a:lstStyle/>
           <a:p>
             <a:r>
-              <a:rPr lang="it-IT" sz="1600" b="1" dirty="0" smtClean="0">
+              <a:rPr lang="it-IT" sz="1600" b="1" dirty="0">
                 <a:latin typeface="Fira Sans" panose="020B0604020202020204" charset="0"/>
               </a:rPr>
               <a:t>Risposta a QR1: </a:t>
             </a:r>
             <a:r>
               <a:rPr lang="it-IT" sz="1600" dirty="0"/>
-              <a:t>Lo strumento mostra una buona correttezza nell’identificare i punti potenzialmente vulnerabili, con una percentuale totale di identificazione corretta del </a:t>
-            </a:r>
-            <a:r>
-              <a:rPr lang="it-IT" sz="1600" dirty="0" smtClean="0"/>
-              <a:t>91%</a:t>
-            </a:r>
-            <a:r>
-              <a:rPr lang="it-IT" sz="1600" b="1" dirty="0">
-                <a:latin typeface="Fira Sans" panose="020B0604020202020204" charset="0"/>
-              </a:rPr>
-              <a:t/>
+              <a:t>Lo strumento mostra una buona correttezza nell’identificare i punti potenzialmente vulnerabili, con una percentuale totale di identificazione corretta del 91%</a:t>
             </a:r>
             <a:br>
               <a:rPr lang="it-IT" sz="1600" b="1" dirty="0">
                 <a:latin typeface="Fira Sans" panose="020B0604020202020204" charset="0"/>
               </a:rPr>
             </a:br>
-            <a:endParaRPr lang="it-IT" sz="1600" b="1" dirty="0" smtClean="0">
+            <a:endParaRPr lang="it-IT" sz="1600" b="1" dirty="0">
               <a:latin typeface="Fira Sans" panose="020B0604020202020204" charset="0"/>
             </a:endParaRPr>
           </a:p>
           <a:p>
             <a:r>
-              <a:rPr lang="it-IT" sz="1600" b="1" dirty="0" smtClean="0">
+              <a:rPr lang="it-IT" sz="1600" b="1" dirty="0">
                 <a:latin typeface="Fira Sans" panose="020B0604020202020204" charset="0"/>
               </a:rPr>
               <a:t>Risposta a QR2: </a:t>
@@ -9154,30 +8978,20 @@
             </a:r>
             <a:r>
               <a:rPr lang="it-IT" sz="1600" dirty="0"/>
-              <a:t>, mostrando una percentuale del 100% nei casi utilizzati per la </a:t>
-            </a:r>
-            <a:r>
-              <a:rPr lang="it-IT" sz="1600" dirty="0" smtClean="0"/>
-              <a:t>sperimentazione</a:t>
-            </a:r>
-            <a:r>
-              <a:rPr lang="it-IT" sz="1600" b="1" dirty="0">
-                <a:latin typeface="Fira Sans" panose="020B0604020202020204" charset="0"/>
-              </a:rPr>
-              <a:t/>
+              <a:t>, mostrando una percentuale del 100% nei casi utilizzati per la sperimentazione</a:t>
             </a:r>
             <a:br>
               <a:rPr lang="it-IT" sz="1600" b="1" dirty="0">
                 <a:latin typeface="Fira Sans" panose="020B0604020202020204" charset="0"/>
               </a:rPr>
             </a:br>
-            <a:endParaRPr lang="it-IT" sz="1600" b="1" dirty="0" smtClean="0">
+            <a:endParaRPr lang="it-IT" sz="1600" b="1" dirty="0">
               <a:latin typeface="Fira Sans" panose="020B0604020202020204" charset="0"/>
             </a:endParaRPr>
           </a:p>
           <a:p>
             <a:r>
-              <a:rPr lang="it-IT" sz="1600" b="1" dirty="0" smtClean="0">
+              <a:rPr lang="it-IT" sz="1600" b="1" dirty="0">
                 <a:latin typeface="Fira Sans" panose="020B0604020202020204" charset="0"/>
               </a:rPr>
               <a:t>Risposta a QR3: </a:t>
@@ -9232,13 +9046,6 @@
   <p:clrMapOvr>
     <a:masterClrMapping/>
   </p:clrMapOvr>
-  <p:timing>
-    <p:tnLst>
-      <p:par>
-        <p:cTn id="1" dur="indefinite" restart="never" nodeType="tmRoot"/>
-      </p:par>
-    </p:tnLst>
-  </p:timing>
 </p:sld>
 </file>
 
@@ -9275,10 +9082,9 @@
           <a:lstStyle/>
           <a:p>
             <a:r>
-              <a:rPr lang="it-IT" dirty="0" smtClean="0"/>
+              <a:rPr lang="it-IT" dirty="0"/>
               <a:t>Considerazioni</a:t>
             </a:r>
-            <a:endParaRPr lang="it-IT" dirty="0"/>
           </a:p>
         </p:txBody>
       </p:sp>
@@ -9298,82 +9104,62 @@
           <a:lstStyle/>
           <a:p>
             <a:r>
-              <a:rPr lang="it-IT" sz="1600" dirty="0" smtClean="0"/>
+              <a:rPr lang="it-IT" sz="1600" dirty="0"/>
               <a:t>Lo strumento implementato fornisce un punto di partenza per trattare la vulnerabilità al mass </a:t>
             </a:r>
             <a:r>
-              <a:rPr lang="it-IT" sz="1600" dirty="0" err="1" smtClean="0"/>
+              <a:rPr lang="it-IT" sz="1600" dirty="0" err="1"/>
               <a:t>assignment</a:t>
             </a:r>
             <a:r>
-              <a:rPr lang="it-IT" sz="1600" dirty="0" smtClean="0"/>
+              <a:rPr lang="it-IT" sz="1600" dirty="0"/>
               <a:t> anche in altri linguaggi e </a:t>
             </a:r>
             <a:r>
-              <a:rPr lang="it-IT" sz="1600" dirty="0" err="1" smtClean="0"/>
+              <a:rPr lang="it-IT" sz="1600" dirty="0" err="1"/>
               <a:t>framework</a:t>
             </a:r>
             <a:r>
-              <a:rPr lang="it-IT" sz="1600" dirty="0" smtClean="0"/>
+              <a:rPr lang="it-IT" sz="1600" dirty="0"/>
               <a:t> di programmazione</a:t>
             </a:r>
             <a:br>
-              <a:rPr lang="it-IT" sz="1600" dirty="0" smtClean="0"/>
+              <a:rPr lang="it-IT" sz="1600" dirty="0"/>
             </a:br>
-            <a:endParaRPr lang="it-IT" sz="1600" dirty="0" smtClean="0"/>
+            <a:endParaRPr lang="it-IT" sz="1600" dirty="0"/>
           </a:p>
           <a:p>
             <a:r>
-              <a:rPr lang="it-IT" sz="1600" dirty="0" smtClean="0"/>
-              <a:t>Può essere utilizzato per verificare la </a:t>
+              <a:rPr lang="it-IT" sz="1600" dirty="0"/>
+              <a:t>Può essere utilizzato per verificare la sicurezza di un’applicazione che implementa REST API contro attacchi via mass </a:t>
             </a:r>
             <a:r>
-              <a:rPr lang="it-IT" sz="1600" dirty="0" smtClean="0"/>
-              <a:t>sicurezza </a:t>
-            </a:r>
-            <a:r>
-              <a:rPr lang="it-IT" sz="1600" dirty="0" smtClean="0"/>
-              <a:t>di un’applicazione </a:t>
-            </a:r>
-            <a:r>
-              <a:rPr lang="it-IT" sz="1600" dirty="0" smtClean="0"/>
-              <a:t>che implementa REST API contro </a:t>
-            </a:r>
-            <a:r>
-              <a:rPr lang="it-IT" sz="1600" dirty="0" smtClean="0"/>
-              <a:t>attacchi via mass </a:t>
-            </a:r>
-            <a:r>
-              <a:rPr lang="it-IT" sz="1600" dirty="0" err="1" smtClean="0"/>
+              <a:rPr lang="it-IT" sz="1600" dirty="0" err="1"/>
               <a:t>assignment</a:t>
             </a:r>
-            <a:r>
-              <a:rPr lang="it-IT" sz="1600" dirty="0" smtClean="0"/>
-              <a:t/>
-            </a:r>
             <a:br>
-              <a:rPr lang="it-IT" sz="1600" dirty="0" smtClean="0"/>
+              <a:rPr lang="it-IT" sz="1600" dirty="0"/>
             </a:br>
-            <a:endParaRPr lang="it-IT" sz="1600" dirty="0" smtClean="0"/>
+            <a:endParaRPr lang="it-IT" sz="1600" dirty="0"/>
           </a:p>
           <a:p>
             <a:r>
-              <a:rPr lang="it-IT" sz="1600" dirty="0" smtClean="0"/>
+              <a:rPr lang="it-IT" sz="1600" dirty="0"/>
               <a:t>Fornisce supporto alla validazione tramite </a:t>
             </a:r>
             <a:r>
-              <a:rPr lang="it-IT" sz="1600" dirty="0" err="1" smtClean="0"/>
+              <a:rPr lang="it-IT" sz="1600" dirty="0" err="1"/>
               <a:t>tool</a:t>
             </a:r>
             <a:r>
-              <a:rPr lang="it-IT" sz="1600" dirty="0" smtClean="0"/>
+              <a:rPr lang="it-IT" sz="1600" dirty="0"/>
               <a:t> di rilevamento automatico di vulnerabilità al mass </a:t>
             </a:r>
             <a:r>
-              <a:rPr lang="it-IT" sz="1600" dirty="0" err="1" smtClean="0"/>
+              <a:rPr lang="it-IT" sz="1600" dirty="0" err="1"/>
               <a:t>assignment</a:t>
             </a:r>
-            <a:endParaRPr lang="it-IT" sz="1600" dirty="0" smtClean="0"/>
+            <a:endParaRPr lang="it-IT" sz="1600" dirty="0"/>
           </a:p>
         </p:txBody>
       </p:sp>
@@ -9419,13 +9205,6 @@
   <p:clrMapOvr>
     <a:masterClrMapping/>
   </p:clrMapOvr>
-  <p:timing>
-    <p:tnLst>
-      <p:par>
-        <p:cTn id="1" dur="indefinite" restart="never" nodeType="tmRoot"/>
-      </p:par>
-    </p:tnLst>
-  </p:timing>
 </p:sld>
 </file>
 
@@ -9738,7 +9517,7 @@
               <a:buNone/>
             </a:pPr>
             <a:r>
-              <a:rPr lang="en" sz="2400" b="1" dirty="0" smtClean="0">
+              <a:rPr lang="en" sz="2400" b="1" dirty="0">
                 <a:solidFill>
                   <a:schemeClr val="tx1"/>
                 </a:solidFill>
@@ -9755,7 +9534,7 @@
               <a:buNone/>
             </a:pPr>
             <a:r>
-              <a:rPr lang="en" sz="2000" dirty="0" smtClean="0">
+              <a:rPr lang="en" sz="2000" dirty="0">
                 <a:solidFill>
                   <a:srgbClr val="263238"/>
                 </a:solidFill>
@@ -9765,7 +9544,7 @@
               <a:t>Prof. </a:t>
             </a:r>
             <a:r>
-              <a:rPr lang="en" sz="2000" i="1" dirty="0" smtClean="0">
+              <a:rPr lang="en" sz="2000" i="1" dirty="0">
                 <a:solidFill>
                   <a:srgbClr val="263238"/>
                 </a:solidFill>
@@ -9774,7 +9553,7 @@
               </a:rPr>
               <a:t>Mariano Ceccato</a:t>
             </a:r>
-            <a:endParaRPr lang="en" sz="2000" b="1" i="1" dirty="0" smtClean="0">
+            <a:endParaRPr lang="en" sz="2000" b="1" i="1" dirty="0">
               <a:solidFill>
                 <a:srgbClr val="0091EA"/>
               </a:solidFill>
@@ -9788,7 +9567,7 @@
               <a:buFont typeface="Arial" panose="020B0604020202020204" pitchFamily="34" charset="0"/>
               <a:buNone/>
             </a:pPr>
-            <a:endParaRPr lang="en" b="1" i="1" dirty="0" smtClean="0">
+            <a:endParaRPr lang="en" b="1" i="1" dirty="0">
               <a:solidFill>
                 <a:srgbClr val="0091EA"/>
               </a:solidFill>
@@ -9802,7 +9581,7 @@
               <a:buNone/>
             </a:pPr>
             <a:r>
-              <a:rPr lang="en" sz="2400" b="1" dirty="0" smtClean="0">
+              <a:rPr lang="en" sz="2400" b="1" dirty="0">
                 <a:solidFill>
                   <a:schemeClr val="tx1"/>
                 </a:solidFill>
@@ -9822,7 +9601,7 @@
               <a:buNone/>
             </a:pPr>
             <a:r>
-              <a:rPr lang="en" sz="2000" dirty="0" smtClean="0">
+              <a:rPr lang="en" sz="2000" dirty="0">
                 <a:solidFill>
                   <a:srgbClr val="263238"/>
                 </a:solidFill>
@@ -9832,7 +9611,7 @@
               <a:t>Dott. </a:t>
             </a:r>
             <a:r>
-              <a:rPr lang="en" sz="2000" i="1" dirty="0" smtClean="0">
+              <a:rPr lang="en" sz="2000" i="1" dirty="0">
                 <a:solidFill>
                   <a:srgbClr val="263238"/>
                 </a:solidFill>
@@ -9841,7 +9620,7 @@
               </a:rPr>
               <a:t>Davide Corradini</a:t>
             </a:r>
-            <a:endParaRPr lang="en" sz="2000" b="1" i="1" dirty="0" smtClean="0">
+            <a:endParaRPr lang="en" sz="2000" b="1" i="1" dirty="0">
               <a:solidFill>
                 <a:srgbClr val="0091EA"/>
               </a:solidFill>
@@ -9855,7 +9634,7 @@
               <a:buFont typeface="Arial" panose="020B0604020202020204" pitchFamily="34" charset="0"/>
               <a:buNone/>
             </a:pPr>
-            <a:endParaRPr lang="en" b="1" i="1" dirty="0" smtClean="0">
+            <a:endParaRPr lang="en" b="1" i="1" dirty="0">
               <a:solidFill>
                 <a:srgbClr val="0091EA"/>
               </a:solidFill>
@@ -9869,7 +9648,7 @@
               <a:buNone/>
             </a:pPr>
             <a:r>
-              <a:rPr lang="en" sz="2400" b="1" dirty="0" smtClean="0">
+              <a:rPr lang="en" sz="2400" b="1" dirty="0">
                 <a:solidFill>
                   <a:schemeClr val="tx1"/>
                 </a:solidFill>
@@ -9889,7 +9668,7 @@
               <a:buNone/>
             </a:pPr>
             <a:r>
-              <a:rPr lang="en" sz="2000" dirty="0" smtClean="0">
+              <a:rPr lang="en" sz="2000" dirty="0">
                 <a:solidFill>
                   <a:srgbClr val="263238"/>
                 </a:solidFill>
@@ -9899,7 +9678,7 @@
               <a:t>Prof. </a:t>
             </a:r>
             <a:r>
-              <a:rPr lang="en" sz="2000" i="1" dirty="0" smtClean="0">
+              <a:rPr lang="en" sz="2000" i="1" dirty="0">
                 <a:solidFill>
                   <a:srgbClr val="263238"/>
                 </a:solidFill>
@@ -10150,7 +9929,7 @@
               <a:buNone/>
             </a:pPr>
             <a:r>
-              <a:rPr lang="en" sz="2400" b="1" dirty="0" smtClean="0">
+              <a:rPr lang="en" sz="2400" b="1" dirty="0">
                 <a:solidFill>
                   <a:schemeClr val="tx1"/>
                 </a:solidFill>
@@ -10160,19 +9939,8 @@
               </a:rPr>
               <a:t>Laureando</a:t>
             </a:r>
-            <a:r>
-              <a:rPr lang="en" b="1" dirty="0" smtClean="0">
-                <a:solidFill>
-                  <a:srgbClr val="0091EA"/>
-                </a:solidFill>
-                <a:latin typeface="Roboto Slab"/>
-                <a:ea typeface="Roboto Slab"/>
-                <a:sym typeface="Roboto Slab"/>
-              </a:rPr>
-              <a:t/>
-            </a:r>
             <a:br>
-              <a:rPr lang="en" b="1" dirty="0" smtClean="0">
+              <a:rPr lang="en" b="1" dirty="0">
                 <a:solidFill>
                   <a:srgbClr val="0091EA"/>
                 </a:solidFill>
@@ -10182,7 +9950,7 @@
               </a:rPr>
             </a:br>
             <a:r>
-              <a:rPr lang="en" sz="2000" i="1" dirty="0" smtClean="0">
+              <a:rPr lang="en" sz="2000" i="1" dirty="0">
                 <a:solidFill>
                   <a:srgbClr val="263238"/>
                 </a:solidFill>
@@ -10192,7 +9960,7 @@
               <a:t>Robert Octavian Timofte</a:t>
             </a:r>
             <a:br>
-              <a:rPr lang="en" sz="2000" i="1" dirty="0" smtClean="0">
+              <a:rPr lang="en" sz="2000" i="1" dirty="0">
                 <a:solidFill>
                   <a:srgbClr val="263238"/>
                 </a:solidFill>
@@ -10201,7 +9969,7 @@
               </a:rPr>
             </a:br>
             <a:r>
-              <a:rPr lang="en" sz="2000" i="1" dirty="0" smtClean="0">
+              <a:rPr lang="en" sz="2000" i="1" dirty="0">
                 <a:solidFill>
                   <a:srgbClr val="263238"/>
                 </a:solidFill>
@@ -10245,14 +10013,11 @@
           <a:p>
             <a:pPr algn="ctr"/>
             <a:r>
-              <a:rPr lang="it-IT" dirty="0" smtClean="0">
+              <a:rPr lang="it-IT" dirty="0">
                 <a:latin typeface="Fira Sans SemiBold" panose="020B0604020202020204" charset="0"/>
               </a:rPr>
               <a:t>ANNO ACCADEMICO 2022/2023</a:t>
             </a:r>
-            <a:endParaRPr lang="it-IT" dirty="0">
-              <a:latin typeface="Fira Sans SemiBold" panose="020B0604020202020204" charset="0"/>
-            </a:endParaRPr>
           </a:p>
         </p:txBody>
       </p:sp>
@@ -10266,13 +10031,6 @@
   <p:clrMapOvr>
     <a:masterClrMapping/>
   </p:clrMapOvr>
-  <p:timing>
-    <p:tnLst>
-      <p:par>
-        <p:cTn id="1" dur="indefinite" restart="never" nodeType="tmRoot"/>
-      </p:par>
-    </p:tnLst>
-  </p:timing>
 </p:sld>
 </file>
 
@@ -10314,10 +10072,9 @@
           <a:lstStyle/>
           <a:p>
             <a:r>
-              <a:rPr lang="it-IT" dirty="0" smtClean="0"/>
+              <a:rPr lang="it-IT" dirty="0"/>
               <a:t>REST API</a:t>
             </a:r>
-            <a:endParaRPr lang="it-IT" dirty="0"/>
           </a:p>
         </p:txBody>
       </p:sp>
@@ -10417,7 +10174,7 @@
           <a:p>
             <a:pPr lvl="1" algn="ctr"/>
             <a:r>
-              <a:rPr lang="it-IT" sz="2000" dirty="0" smtClean="0">
+              <a:rPr lang="it-IT" sz="2000" dirty="0">
                 <a:solidFill>
                   <a:schemeClr val="bg1"/>
                 </a:solidFill>
@@ -10425,12 +10182,6 @@
               </a:rPr>
               <a:t>Client</a:t>
             </a:r>
-            <a:endParaRPr lang="it-IT" sz="2000" dirty="0">
-              <a:solidFill>
-                <a:schemeClr val="bg1"/>
-              </a:solidFill>
-              <a:latin typeface="Fira Sans Light" panose="020B0604020202020204" charset="0"/>
-            </a:endParaRPr>
           </a:p>
         </p:txBody>
       </p:sp>
@@ -10498,7 +10249,7 @@
           <a:p>
             <a:pPr algn="ctr"/>
             <a:r>
-              <a:rPr lang="it-IT" sz="2000" dirty="0" smtClean="0">
+              <a:rPr lang="it-IT" sz="2000" dirty="0">
                 <a:solidFill>
                   <a:schemeClr val="bg1"/>
                 </a:solidFill>
@@ -10506,12 +10257,6 @@
               </a:rPr>
               <a:t>Server</a:t>
             </a:r>
-            <a:endParaRPr lang="it-IT" sz="2000" dirty="0">
-              <a:solidFill>
-                <a:schemeClr val="bg1"/>
-              </a:solidFill>
-              <a:latin typeface="Fira Sans Light" panose="020B0604020202020204" charset="0"/>
-            </a:endParaRPr>
           </a:p>
         </p:txBody>
       </p:sp>
@@ -10587,7 +10332,7 @@
           <a:p>
             <a:pPr algn="ctr"/>
             <a:r>
-              <a:rPr lang="it-IT" sz="2000" dirty="0" smtClean="0">
+              <a:rPr lang="it-IT" sz="2000" dirty="0">
                 <a:solidFill>
                   <a:schemeClr val="bg1"/>
                 </a:solidFill>
@@ -10595,12 +10340,6 @@
               </a:rPr>
               <a:t>HTTP</a:t>
             </a:r>
-            <a:endParaRPr lang="it-IT" sz="2000" dirty="0">
-              <a:solidFill>
-                <a:schemeClr val="bg1"/>
-              </a:solidFill>
-              <a:latin typeface="Fira Sans Light" panose="020B0604020202020204" charset="0"/>
-            </a:endParaRPr>
           </a:p>
         </p:txBody>
       </p:sp>
@@ -10676,7 +10415,7 @@
           <a:p>
             <a:pPr algn="ctr"/>
             <a:r>
-              <a:rPr lang="it-IT" sz="2000" dirty="0" smtClean="0">
+              <a:rPr lang="it-IT" sz="2000" dirty="0">
                 <a:solidFill>
                   <a:schemeClr val="bg1"/>
                 </a:solidFill>
@@ -10684,12 +10423,6 @@
               </a:rPr>
               <a:t>URI</a:t>
             </a:r>
-            <a:endParaRPr lang="it-IT" sz="2000" dirty="0">
-              <a:solidFill>
-                <a:schemeClr val="bg1"/>
-              </a:solidFill>
-              <a:latin typeface="Fira Sans Light" panose="020B0604020202020204" charset="0"/>
-            </a:endParaRPr>
           </a:p>
         </p:txBody>
       </p:sp>
@@ -10765,7 +10498,7 @@
           <a:p>
             <a:pPr algn="ctr"/>
             <a:r>
-              <a:rPr lang="it-IT" sz="2000" dirty="0" smtClean="0">
+              <a:rPr lang="it-IT" sz="2000" dirty="0">
                 <a:solidFill>
                   <a:schemeClr val="bg1"/>
                 </a:solidFill>
@@ -10773,12 +10506,6 @@
               </a:rPr>
               <a:t>JSON</a:t>
             </a:r>
-            <a:endParaRPr lang="it-IT" sz="2000" dirty="0">
-              <a:solidFill>
-                <a:schemeClr val="bg1"/>
-              </a:solidFill>
-              <a:latin typeface="Fira Sans Light" panose="020B0604020202020204" charset="0"/>
-            </a:endParaRPr>
           </a:p>
         </p:txBody>
       </p:sp>
@@ -10806,7 +10533,7 @@
           <a:p>
             <a:pPr algn="ctr"/>
             <a:r>
-              <a:rPr lang="it-IT" dirty="0" smtClean="0">
+              <a:rPr lang="it-IT" dirty="0">
                 <a:latin typeface="Fira Sans Light" panose="020B0604020202020204" charset="0"/>
               </a:rPr>
               <a:t>GET</a:t>
@@ -10815,7 +10542,7 @@
           <a:p>
             <a:pPr algn="ctr"/>
             <a:r>
-              <a:rPr lang="it-IT" dirty="0" smtClean="0">
+              <a:rPr lang="it-IT" dirty="0">
                 <a:latin typeface="Fira Sans Light" panose="020B0604020202020204" charset="0"/>
               </a:rPr>
               <a:t>POST</a:t>
@@ -10824,7 +10551,7 @@
           <a:p>
             <a:pPr algn="ctr"/>
             <a:r>
-              <a:rPr lang="it-IT" dirty="0" smtClean="0">
+              <a:rPr lang="it-IT" dirty="0">
                 <a:latin typeface="Fira Sans Light" panose="020B0604020202020204" charset="0"/>
               </a:rPr>
               <a:t>DELETE</a:t>
@@ -10833,14 +10560,11 @@
           <a:p>
             <a:pPr algn="ctr"/>
             <a:r>
-              <a:rPr lang="it-IT" dirty="0" smtClean="0">
+              <a:rPr lang="it-IT" dirty="0">
                 <a:latin typeface="Fira Sans Light" panose="020B0604020202020204" charset="0"/>
               </a:rPr>
               <a:t>PUT</a:t>
             </a:r>
-            <a:endParaRPr lang="it-IT" dirty="0">
-              <a:latin typeface="Fira Sans Light" panose="020B0604020202020204" charset="0"/>
-            </a:endParaRPr>
           </a:p>
         </p:txBody>
       </p:sp>
@@ -10868,7 +10592,7 @@
           <a:p>
             <a:pPr algn="ctr"/>
             <a:r>
-              <a:rPr lang="it-IT" dirty="0" smtClean="0">
+              <a:rPr lang="it-IT" dirty="0">
                 <a:latin typeface="Fira Sans Light" panose="020B0604020202020204" charset="0"/>
               </a:rPr>
               <a:t>/utente</a:t>
@@ -10877,7 +10601,7 @@
           <a:p>
             <a:pPr algn="ctr"/>
             <a:r>
-              <a:rPr lang="it-IT" dirty="0" smtClean="0">
+              <a:rPr lang="it-IT" dirty="0">
                 <a:latin typeface="Fira Sans Light" panose="020B0604020202020204" charset="0"/>
               </a:rPr>
               <a:t>/utente/123</a:t>
@@ -10886,7 +10610,7 @@
           <a:p>
             <a:pPr algn="ctr"/>
             <a:r>
-              <a:rPr lang="it-IT" dirty="0" smtClean="0">
+              <a:rPr lang="it-IT" dirty="0">
                 <a:latin typeface="Fira Sans Light" panose="020B0604020202020204" charset="0"/>
               </a:rPr>
               <a:t>…</a:t>
@@ -10917,14 +10641,11 @@
           <a:lstStyle/>
           <a:p>
             <a:r>
-              <a:rPr lang="it-IT" sz="1000" dirty="0" smtClean="0">
+              <a:rPr lang="it-IT" sz="1000" dirty="0">
                 <a:latin typeface="Fira Sans Light" panose="020B0604020202020204" charset="0"/>
               </a:rPr>
               <a:t>{</a:t>
             </a:r>
-            <a:endParaRPr lang="it-IT" sz="1000" dirty="0">
-              <a:latin typeface="Fira Sans Light" panose="020B0604020202020204" charset="0"/>
-            </a:endParaRPr>
           </a:p>
           <a:p>
             <a:r>
@@ -10954,13 +10675,7 @@
               <a:rPr lang="it-IT" sz="1000" i="1" dirty="0">
                 <a:latin typeface="Fira Sans Light" panose="020B0604020202020204" charset="0"/>
               </a:rPr>
-              <a:t>password</a:t>
-            </a:r>
-            <a:r>
-              <a:rPr lang="it-IT" sz="1000" i="1" dirty="0" smtClean="0">
-                <a:latin typeface="Fira Sans Light" panose="020B0604020202020204" charset="0"/>
-              </a:rPr>
-              <a:t>,</a:t>
+              <a:t>password,</a:t>
             </a:r>
           </a:p>
           <a:p>
@@ -10968,22 +10683,16 @@
               <a:rPr lang="it-IT" sz="1000" i="1" dirty="0">
                 <a:latin typeface="Fira Sans Light" panose="020B0604020202020204" charset="0"/>
               </a:rPr>
-              <a:t> </a:t>
+              <a:t>    </a:t>
             </a:r>
             <a:r>
-              <a:rPr lang="it-IT" sz="1000" i="1" dirty="0" smtClean="0">
-                <a:latin typeface="Fira Sans Light" panose="020B0604020202020204" charset="0"/>
-              </a:rPr>
-              <a:t>   </a:t>
-            </a:r>
-            <a:r>
-              <a:rPr lang="it-IT" sz="1000" dirty="0" smtClean="0">
+              <a:rPr lang="it-IT" sz="1000" dirty="0">
                 <a:latin typeface="Fira Sans Light" panose="020B0604020202020204" charset="0"/>
               </a:rPr>
               <a:t>"nome": </a:t>
             </a:r>
             <a:r>
-              <a:rPr lang="it-IT" sz="1000" i="1" dirty="0" smtClean="0">
+              <a:rPr lang="it-IT" sz="1000" i="1" dirty="0">
                 <a:latin typeface="Fira Sans Light" panose="020B0604020202020204" charset="0"/>
               </a:rPr>
               <a:t>nome,</a:t>
@@ -10997,34 +10706,22 @@
               <a:rPr lang="it-IT" sz="1000" dirty="0">
                 <a:latin typeface="Fira Sans Light" panose="020B0604020202020204" charset="0"/>
               </a:rPr>
-              <a:t> </a:t>
+              <a:t>    "cognome": </a:t>
             </a:r>
             <a:r>
-              <a:rPr lang="it-IT" sz="1000" dirty="0" smtClean="0">
-                <a:latin typeface="Fira Sans Light" panose="020B0604020202020204" charset="0"/>
-              </a:rPr>
-              <a:t>   "cognome": </a:t>
-            </a:r>
-            <a:r>
-              <a:rPr lang="it-IT" sz="1000" i="1" dirty="0" smtClean="0">
+              <a:rPr lang="it-IT" sz="1000" i="1" dirty="0">
                 <a:latin typeface="Fira Sans Light" panose="020B0604020202020204" charset="0"/>
               </a:rPr>
               <a:t>cognome</a:t>
             </a:r>
-            <a:endParaRPr lang="it-IT" sz="1000" i="1" dirty="0">
-              <a:latin typeface="Fira Sans Light" panose="020B0604020202020204" charset="0"/>
-            </a:endParaRPr>
           </a:p>
           <a:p>
             <a:r>
-              <a:rPr lang="it-IT" sz="1000" dirty="0" smtClean="0">
+              <a:rPr lang="it-IT" sz="1000" dirty="0">
                 <a:latin typeface="Fira Sans Light" panose="020B0604020202020204" charset="0"/>
               </a:rPr>
               <a:t>}</a:t>
             </a:r>
-            <a:endParaRPr lang="it-IT" sz="1000" dirty="0">
-              <a:latin typeface="Fira Sans Light" panose="020B0604020202020204" charset="0"/>
-            </a:endParaRPr>
           </a:p>
         </p:txBody>
       </p:sp>
@@ -11196,13 +10893,6 @@
   <p:clrMapOvr>
     <a:masterClrMapping/>
   </p:clrMapOvr>
-  <p:timing>
-    <p:tnLst>
-      <p:par>
-        <p:cTn id="1" dur="indefinite" restart="never" nodeType="tmRoot"/>
-      </p:par>
-    </p:tnLst>
-  </p:timing>
 </p:sld>
 </file>
 
@@ -11239,11 +10929,11 @@
           <a:lstStyle/>
           <a:p>
             <a:r>
-              <a:rPr lang="it-IT" dirty="0" smtClean="0"/>
+              <a:rPr lang="it-IT" dirty="0"/>
               <a:t>Mass </a:t>
             </a:r>
             <a:r>
-              <a:rPr lang="it-IT" dirty="0" err="1" smtClean="0"/>
+              <a:rPr lang="it-IT" dirty="0" err="1"/>
               <a:t>assignment</a:t>
             </a:r>
             <a:endParaRPr lang="it-IT" dirty="0"/>
@@ -11275,7 +10965,7 @@
               <a:buChar char="•"/>
             </a:pPr>
             <a:r>
-              <a:rPr lang="it-IT" sz="1400" dirty="0" smtClean="0"/>
+              <a:rPr lang="it-IT" sz="1400" dirty="0"/>
               <a:t>Funzionalità di mappatura automatica dei parametri passati ad una REST API</a:t>
             </a:r>
           </a:p>
@@ -11292,29 +10982,13 @@
               <a:buChar char="•"/>
             </a:pPr>
             <a:r>
-              <a:rPr lang="it-IT" sz="1400" dirty="0" smtClean="0"/>
-              <a:t>Nelle REST API, le proprietà di una risorsa possono essere leggibili </a:t>
-            </a:r>
-            <a:r>
-              <a:rPr lang="it-IT" sz="1400" dirty="0" smtClean="0"/>
-              <a:t>(R) o </a:t>
-            </a:r>
-            <a:r>
-              <a:rPr lang="it-IT" sz="1400" dirty="0" smtClean="0"/>
-              <a:t>anche </a:t>
-            </a:r>
-            <a:r>
-              <a:rPr lang="it-IT" sz="1400" dirty="0" smtClean="0"/>
-              <a:t>scrivibili (W) </a:t>
-            </a:r>
-            <a:r>
-              <a:rPr lang="it-IT" sz="1400" dirty="0" smtClean="0"/>
-              <a:t/>
+              <a:rPr lang="it-IT" sz="1400" dirty="0"/>
+              <a:t>Nelle REST API, le proprietà di una risorsa possono essere leggibili (R) o anche scrivibili (W) </a:t>
             </a:r>
             <a:br>
-              <a:rPr lang="it-IT" sz="1400" dirty="0" smtClean="0"/>
+              <a:rPr lang="it-IT" sz="1400" dirty="0"/>
             </a:br>
-            <a:endParaRPr lang="it-IT" sz="1400" dirty="0" smtClean="0"/>
+            <a:endParaRPr lang="it-IT" sz="1400" dirty="0"/>
           </a:p>
           <a:p>
             <a:pPr>
@@ -11322,13 +10996,13 @@
               <a:buChar char="•"/>
             </a:pPr>
             <a:r>
-              <a:rPr lang="it-IT" sz="1400" dirty="0" smtClean="0"/>
+              <a:rPr lang="it-IT" sz="1400" dirty="0"/>
               <a:t>A causa di errori di programmazione una proprietà leggibile può essere comunque modificata</a:t>
             </a:r>
             <a:br>
-              <a:rPr lang="it-IT" sz="1400" dirty="0" smtClean="0"/>
+              <a:rPr lang="it-IT" sz="1400" dirty="0"/>
             </a:br>
-            <a:endParaRPr lang="it-IT" sz="1400" dirty="0" smtClean="0"/>
+            <a:endParaRPr lang="it-IT" sz="1400" dirty="0"/>
           </a:p>
           <a:p>
             <a:pPr>
@@ -11336,18 +11010,17 @@
               <a:buChar char="•"/>
             </a:pPr>
             <a:r>
-              <a:rPr lang="it-IT" sz="1400" dirty="0" smtClean="0"/>
+              <a:rPr lang="it-IT" sz="1400" dirty="0"/>
               <a:t>La vulnerabilità al mass </a:t>
             </a:r>
             <a:r>
-              <a:rPr lang="it-IT" sz="1400" dirty="0" err="1" smtClean="0"/>
+              <a:rPr lang="it-IT" sz="1400" dirty="0" err="1"/>
               <a:t>assignment</a:t>
             </a:r>
             <a:r>
-              <a:rPr lang="it-IT" sz="1400" dirty="0" smtClean="0"/>
+              <a:rPr lang="it-IT" sz="1400" dirty="0"/>
               <a:t> si manifesta quando una proprietà leggibile viene scritta o modificata con successo</a:t>
             </a:r>
-            <a:endParaRPr lang="it-IT" sz="1400" dirty="0"/>
           </a:p>
         </p:txBody>
       </p:sp>
@@ -11420,7 +11093,7 @@
           <a:p>
             <a:pPr algn="ctr"/>
             <a:r>
-              <a:rPr lang="it-IT" i="1" u="sng" dirty="0" smtClean="0">
+              <a:rPr lang="it-IT" i="1" u="sng" dirty="0">
                 <a:latin typeface="Fira Sans Light" panose="020B0604020202020204" charset="0"/>
               </a:rPr>
               <a:t>UTENTE</a:t>
@@ -11429,36 +11102,18 @@
           <a:p>
             <a:pPr algn="ctr"/>
             <a:r>
-              <a:rPr lang="it-IT" b="1" dirty="0">
-                <a:latin typeface="Fira Sans Light" panose="020B0604020202020204" charset="0"/>
+              <a:rPr lang="it-IT" dirty="0">
+                <a:latin typeface="Fira Sans SemiBold" panose="020B0603050000020004" pitchFamily="34" charset="0"/>
               </a:rPr>
-              <a:t>e</a:t>
+              <a:t>email (W): </a:t>
             </a:r>
             <a:r>
-              <a:rPr lang="it-IT" b="1" dirty="0" smtClean="0">
-                <a:latin typeface="Fira Sans Light" panose="020B0604020202020204" charset="0"/>
-              </a:rPr>
-              <a:t>mail</a:t>
-            </a:r>
-            <a:r>
-              <a:rPr lang="it-IT" dirty="0" smtClean="0">
-                <a:latin typeface="Fira Sans Light" panose="020B0604020202020204" charset="0"/>
-              </a:rPr>
-              <a:t> (W)</a:t>
-            </a:r>
-            <a:r>
-              <a:rPr lang="it-IT" dirty="0" smtClean="0">
-                <a:latin typeface="Fira Sans Light" panose="020B0604020202020204" charset="0"/>
-              </a:rPr>
-              <a:t>: </a:t>
-            </a:r>
-            <a:r>
-              <a:rPr lang="it-IT" i="1" dirty="0" err="1" smtClean="0">
+              <a:rPr lang="it-IT" i="1" dirty="0" err="1">
                 <a:latin typeface="Fira Sans Light" panose="020B0604020202020204" charset="0"/>
               </a:rPr>
               <a:t>string</a:t>
             </a:r>
-            <a:endParaRPr lang="it-IT" i="1" dirty="0" smtClean="0">
+            <a:endParaRPr lang="it-IT" i="1" dirty="0">
               <a:latin typeface="Fira Sans Light" panose="020B0604020202020204" charset="0"/>
             </a:endParaRPr>
           </a:p>
@@ -11466,23 +11121,23 @@
             <a:pPr algn="ctr"/>
             <a:r>
               <a:rPr lang="it-IT" dirty="0">
+                <a:latin typeface="Fira Sans SemiBold" panose="020B0603050000020004" pitchFamily="34" charset="0"/>
+              </a:rPr>
+              <a:t>password (W):</a:t>
+            </a:r>
+            <a:r>
+              <a:rPr lang="it-IT" dirty="0">
                 <a:latin typeface="Fira Sans Light" panose="020B0604020202020204" charset="0"/>
               </a:rPr>
-              <a:t>p</a:t>
+              <a:t> </a:t>
             </a:r>
             <a:r>
-              <a:rPr lang="it-IT" dirty="0" smtClean="0">
-                <a:latin typeface="Fira Sans Light" panose="020B0604020202020204" charset="0"/>
-              </a:rPr>
-              <a:t>assword (W): </a:t>
-            </a:r>
-            <a:r>
-              <a:rPr lang="it-IT" i="1" dirty="0" err="1" smtClean="0">
+              <a:rPr lang="it-IT" i="1" dirty="0" err="1">
                 <a:latin typeface="Fira Sans Light" panose="020B0604020202020204" charset="0"/>
               </a:rPr>
               <a:t>string</a:t>
             </a:r>
-            <a:endParaRPr lang="it-IT" dirty="0" smtClean="0">
+            <a:endParaRPr lang="it-IT" dirty="0">
               <a:latin typeface="Fira Sans Light" panose="020B0604020202020204" charset="0"/>
             </a:endParaRPr>
           </a:p>
@@ -11490,39 +11145,35 @@
             <a:pPr algn="ctr"/>
             <a:r>
               <a:rPr lang="it-IT" dirty="0" err="1">
-                <a:latin typeface="Fira Sans Light" panose="020B0604020202020204" charset="0"/>
+                <a:latin typeface="Fira Sans SemiBold" panose="020B0603050000020004" pitchFamily="34" charset="0"/>
               </a:rPr>
-              <a:t>a</a:t>
+              <a:t>admin</a:t>
             </a:r>
             <a:r>
-              <a:rPr lang="it-IT" dirty="0" err="1" smtClean="0">
-                <a:latin typeface="Fira Sans Light" panose="020B0604020202020204" charset="0"/>
-              </a:rPr>
-              <a:t>dmin</a:t>
-            </a:r>
-            <a:r>
-              <a:rPr lang="it-IT" dirty="0" smtClean="0">
-                <a:latin typeface="Fira Sans Light" panose="020B0604020202020204" charset="0"/>
+              <a:rPr lang="it-IT" dirty="0">
+                <a:latin typeface="Fira Sans SemiBold" panose="020B0603050000020004" pitchFamily="34" charset="0"/>
               </a:rPr>
               <a:t> </a:t>
             </a:r>
             <a:r>
-              <a:rPr lang="it-IT" b="1" dirty="0" smtClean="0"/>
+              <a:rPr lang="it-IT" b="1" dirty="0">
+                <a:latin typeface="Fira Sans SemiBold" panose="020B0603050000020004" pitchFamily="34" charset="0"/>
+              </a:rPr>
               <a:t>(R):</a:t>
             </a:r>
             <a:r>
-              <a:rPr lang="it-IT" dirty="0" smtClean="0">
-                <a:latin typeface="Fira Sans Light" panose="020B0604020202020204" charset="0"/>
+              <a:rPr lang="it-IT" dirty="0">
+                <a:latin typeface="Fira Sans SemiBold" panose="020B0603050000020004" pitchFamily="34" charset="0"/>
               </a:rPr>
               <a:t> </a:t>
             </a:r>
             <a:r>
-              <a:rPr lang="it-IT" i="1" dirty="0" err="1" smtClean="0">
+              <a:rPr lang="it-IT" i="1" dirty="0" err="1">
                 <a:latin typeface="Fira Sans Light" panose="020B0604020202020204" charset="0"/>
               </a:rPr>
               <a:t>boolean</a:t>
             </a:r>
-            <a:endParaRPr lang="it-IT" dirty="0" smtClean="0">
+            <a:endParaRPr lang="it-IT" dirty="0">
               <a:latin typeface="Fira Sans Light" panose="020B0604020202020204" charset="0"/>
             </a:endParaRPr>
           </a:p>
@@ -11538,13 +11189,6 @@
   <p:clrMapOvr>
     <a:masterClrMapping/>
   </p:clrMapOvr>
-  <p:timing>
-    <p:tnLst>
-      <p:par>
-        <p:cTn id="1" dur="indefinite" restart="never" nodeType="tmRoot"/>
-      </p:par>
-    </p:tnLst>
-  </p:timing>
 </p:sld>
 </file>
 
@@ -11600,7 +11244,7 @@
               <a:buNone/>
             </a:pPr>
             <a:r>
-              <a:rPr lang="en" dirty="0" smtClean="0"/>
+              <a:rPr lang="en" dirty="0"/>
               <a:t>Vulnerabilità al mass assignment</a:t>
             </a:r>
             <a:endParaRPr dirty="0"/>
@@ -11713,7 +11357,7 @@
           <a:p>
             <a:pPr algn="ctr"/>
             <a:r>
-              <a:rPr lang="it-IT" sz="2000" dirty="0" smtClean="0">
+              <a:rPr lang="it-IT" sz="2000" dirty="0">
                 <a:solidFill>
                   <a:schemeClr val="bg1"/>
                 </a:solidFill>
@@ -11721,12 +11365,6 @@
               </a:rPr>
               <a:t>Client</a:t>
             </a:r>
-            <a:endParaRPr lang="it-IT" sz="2000" dirty="0">
-              <a:solidFill>
-                <a:schemeClr val="bg1"/>
-              </a:solidFill>
-              <a:latin typeface="Fira Sans Light" panose="020B0604020202020204" charset="0"/>
-            </a:endParaRPr>
           </a:p>
         </p:txBody>
       </p:sp>
@@ -11794,7 +11432,7 @@
           <a:p>
             <a:pPr algn="ctr"/>
             <a:r>
-              <a:rPr lang="it-IT" sz="2000" dirty="0" smtClean="0">
+              <a:rPr lang="it-IT" sz="2000" dirty="0">
                 <a:solidFill>
                   <a:schemeClr val="bg1"/>
                 </a:solidFill>
@@ -11802,12 +11440,6 @@
               </a:rPr>
               <a:t>Server</a:t>
             </a:r>
-            <a:endParaRPr lang="it-IT" sz="2000" dirty="0">
-              <a:solidFill>
-                <a:schemeClr val="bg1"/>
-              </a:solidFill>
-              <a:latin typeface="Fira Sans Light" panose="020B0604020202020204" charset="0"/>
-            </a:endParaRPr>
           </a:p>
         </p:txBody>
       </p:sp>
@@ -12629,7 +12261,7 @@
           <a:p>
             <a:pPr algn="ctr"/>
             <a:r>
-              <a:rPr lang="it-IT" sz="2000" dirty="0" smtClean="0">
+              <a:rPr lang="it-IT" sz="2000" dirty="0">
                 <a:solidFill>
                   <a:schemeClr val="tx1"/>
                 </a:solidFill>
@@ -12637,12 +12269,6 @@
               </a:rPr>
               <a:t>REST API</a:t>
             </a:r>
-            <a:endParaRPr lang="it-IT" sz="2000" dirty="0">
-              <a:solidFill>
-                <a:schemeClr val="tx1"/>
-              </a:solidFill>
-              <a:latin typeface="Fira Sans Light" panose="020B0604020202020204" charset="0"/>
-            </a:endParaRPr>
           </a:p>
         </p:txBody>
       </p:sp>
@@ -12814,14 +12440,11 @@
           <a:p>
             <a:pPr algn="ctr"/>
             <a:r>
-              <a:rPr lang="it-IT" dirty="0" smtClean="0">
+              <a:rPr lang="it-IT" dirty="0">
                 <a:latin typeface="Fira Sans Light" panose="020B0604020202020204" charset="0"/>
               </a:rPr>
               <a:t>UTENTE CREATO</a:t>
             </a:r>
-            <a:endParaRPr lang="it-IT" dirty="0">
-              <a:latin typeface="Fira Sans Light" panose="020B0604020202020204" charset="0"/>
-            </a:endParaRPr>
           </a:p>
         </p:txBody>
       </p:sp>
@@ -12848,7 +12471,7 @@
           <a:lstStyle/>
           <a:p>
             <a:r>
-              <a:rPr lang="it-IT" sz="1200" dirty="0" smtClean="0">
+              <a:rPr lang="it-IT" sz="1200" dirty="0">
                 <a:latin typeface="Fira Sans Light" panose="020B0604020202020204" charset="0"/>
               </a:rPr>
               <a:t>{</a:t>
@@ -12862,12 +12485,12 @@
               <a:t>    "email": </a:t>
             </a:r>
             <a:r>
-              <a:rPr lang="it-IT" sz="1200" i="1" dirty="0" smtClean="0">
+              <a:rPr lang="it-IT" sz="1200" i="1" dirty="0">
                 <a:latin typeface="Fira Sans Light" panose="020B0604020202020204" charset="0"/>
               </a:rPr>
               <a:t>email,</a:t>
             </a:r>
-            <a:endParaRPr lang="it-IT" sz="1200" dirty="0" smtClean="0">
+            <a:endParaRPr lang="it-IT" sz="1200" dirty="0">
               <a:latin typeface="Fira Sans Light" panose="020B0604020202020204" charset="0"/>
             </a:endParaRPr>
           </a:p>
@@ -12879,7 +12502,7 @@
               <a:t>    "password": </a:t>
             </a:r>
             <a:r>
-              <a:rPr lang="it-IT" sz="1200" i="1" dirty="0" smtClean="0">
+              <a:rPr lang="it-IT" sz="1200" i="1" dirty="0">
                 <a:latin typeface="Fira Sans Light" panose="020B0604020202020204" charset="0"/>
               </a:rPr>
               <a:t>password</a:t>
@@ -12890,14 +12513,11 @@
           </a:p>
           <a:p>
             <a:r>
-              <a:rPr lang="it-IT" sz="1200" dirty="0" smtClean="0">
+              <a:rPr lang="it-IT" sz="1200" dirty="0">
                 <a:latin typeface="Fira Sans Light" panose="020B0604020202020204" charset="0"/>
               </a:rPr>
               <a:t>}</a:t>
             </a:r>
-            <a:endParaRPr lang="it-IT" sz="1200" dirty="0">
-              <a:latin typeface="Fira Sans Light" panose="020B0604020202020204" charset="0"/>
-            </a:endParaRPr>
           </a:p>
         </p:txBody>
       </p:sp>
@@ -12924,7 +12544,7 @@
           <a:lstStyle/>
           <a:p>
             <a:r>
-              <a:rPr lang="it-IT" sz="1200" dirty="0" smtClean="0">
+              <a:rPr lang="it-IT" sz="1200" dirty="0">
                 <a:latin typeface="Fira Sans Light" panose="020B0604020202020204" charset="0"/>
               </a:rPr>
               <a:t>{</a:t>
@@ -12938,12 +12558,12 @@
               <a:t>    "email": </a:t>
             </a:r>
             <a:r>
-              <a:rPr lang="it-IT" sz="1200" i="1" dirty="0" smtClean="0">
+              <a:rPr lang="it-IT" sz="1200" i="1" dirty="0">
                 <a:latin typeface="Fira Sans Light" panose="020B0604020202020204" charset="0"/>
               </a:rPr>
               <a:t>email,</a:t>
             </a:r>
-            <a:endParaRPr lang="it-IT" sz="1200" dirty="0" smtClean="0">
+            <a:endParaRPr lang="it-IT" sz="1200" dirty="0">
               <a:latin typeface="Fira Sans Light" panose="020B0604020202020204" charset="0"/>
             </a:endParaRPr>
           </a:p>
@@ -12955,7 +12575,7 @@
               <a:t>    "password": </a:t>
             </a:r>
             <a:r>
-              <a:rPr lang="it-IT" sz="1200" i="1" dirty="0" smtClean="0">
+              <a:rPr lang="it-IT" sz="1200" i="1" dirty="0">
                 <a:latin typeface="Fira Sans Light" panose="020B0604020202020204" charset="0"/>
               </a:rPr>
               <a:t>password,</a:t>
@@ -12981,7 +12601,7 @@
               <a:t>": </a:t>
             </a:r>
             <a:r>
-              <a:rPr lang="it-IT" sz="1200" i="1" dirty="0" err="1" smtClean="0">
+              <a:rPr lang="it-IT" sz="1200" i="1" dirty="0" err="1">
                 <a:latin typeface="Fira Sans Light" panose="020B0604020202020204" charset="0"/>
               </a:rPr>
               <a:t>true</a:t>
@@ -12992,14 +12612,11 @@
           </a:p>
           <a:p>
             <a:r>
-              <a:rPr lang="it-IT" sz="1200" dirty="0" smtClean="0">
+              <a:rPr lang="it-IT" sz="1200" dirty="0">
                 <a:latin typeface="Fira Sans Light" panose="020B0604020202020204" charset="0"/>
               </a:rPr>
               <a:t>}</a:t>
             </a:r>
-            <a:endParaRPr lang="it-IT" sz="1200" dirty="0">
-              <a:latin typeface="Fira Sans Light" panose="020B0604020202020204" charset="0"/>
-            </a:endParaRPr>
           </a:p>
         </p:txBody>
       </p:sp>
@@ -13189,10 +12806,9 @@
           <a:lstStyle/>
           <a:p>
             <a:r>
-              <a:rPr lang="it-IT" dirty="0" smtClean="0"/>
+              <a:rPr lang="it-IT" dirty="0"/>
               <a:t>Problema affrontato</a:t>
             </a:r>
-            <a:endParaRPr lang="it-IT" dirty="0"/>
           </a:p>
         </p:txBody>
       </p:sp>
@@ -13212,62 +12828,62 @@
           <a:lstStyle/>
           <a:p>
             <a:r>
-              <a:rPr lang="it-IT" sz="1600" dirty="0" smtClean="0"/>
+              <a:rPr lang="it-IT" sz="1600" dirty="0"/>
               <a:t>Il problema affrontato nella tesi è lo sviluppo di uno strumento di iniezione di vulnerabilità al mass </a:t>
             </a:r>
             <a:r>
-              <a:rPr lang="it-IT" sz="1600" dirty="0" err="1" smtClean="0"/>
+              <a:rPr lang="it-IT" sz="1600" dirty="0" err="1"/>
               <a:t>assignment</a:t>
             </a:r>
             <a:r>
-              <a:rPr lang="it-IT" sz="1600" dirty="0" smtClean="0"/>
+              <a:rPr lang="it-IT" sz="1600" dirty="0"/>
               <a:t> nelle REST API</a:t>
             </a:r>
             <a:br>
-              <a:rPr lang="it-IT" sz="1600" dirty="0" smtClean="0"/>
+              <a:rPr lang="it-IT" sz="1600" dirty="0"/>
             </a:br>
-            <a:endParaRPr lang="it-IT" sz="1600" dirty="0" smtClean="0"/>
+            <a:endParaRPr lang="it-IT" sz="1600" dirty="0"/>
           </a:p>
           <a:p>
             <a:r>
-              <a:rPr lang="it-IT" sz="1600" dirty="0" smtClean="0"/>
+              <a:rPr lang="it-IT" sz="1600" dirty="0"/>
               <a:t>3 fasi:</a:t>
             </a:r>
           </a:p>
           <a:p>
             <a:pPr lvl="1"/>
             <a:r>
-              <a:rPr lang="it-IT" sz="1600" dirty="0" smtClean="0"/>
+              <a:rPr lang="it-IT" sz="1600" dirty="0"/>
               <a:t>Identificazione dei linguaggi di programmazione più popolari e dei </a:t>
             </a:r>
             <a:r>
-              <a:rPr lang="it-IT" sz="1600" dirty="0" err="1" smtClean="0"/>
+              <a:rPr lang="it-IT" sz="1600" dirty="0" err="1"/>
               <a:t>framework</a:t>
             </a:r>
             <a:r>
-              <a:rPr lang="it-IT" sz="1600" dirty="0" smtClean="0"/>
+              <a:rPr lang="it-IT" sz="1600" dirty="0"/>
               <a:t> più utilizzati</a:t>
             </a:r>
           </a:p>
           <a:p>
             <a:pPr lvl="1"/>
             <a:r>
-              <a:rPr lang="it-IT" sz="1600" dirty="0" smtClean="0"/>
+              <a:rPr lang="it-IT" sz="1600" dirty="0"/>
               <a:t>Implementazione del </a:t>
             </a:r>
             <a:r>
-              <a:rPr lang="it-IT" sz="1600" dirty="0" err="1" smtClean="0"/>
+              <a:rPr lang="it-IT" sz="1600" dirty="0" err="1"/>
               <a:t>tool</a:t>
             </a:r>
             <a:r>
-              <a:rPr lang="it-IT" sz="1600" dirty="0" smtClean="0"/>
+              <a:rPr lang="it-IT" sz="1600" dirty="0"/>
               <a:t> di iniezione</a:t>
             </a:r>
           </a:p>
           <a:p>
             <a:pPr lvl="1"/>
             <a:r>
-              <a:rPr lang="it-IT" sz="1600" dirty="0" smtClean="0"/>
+              <a:rPr lang="it-IT" sz="1600" dirty="0"/>
               <a:t>Validazione dello strumento prodotto</a:t>
             </a:r>
           </a:p>
@@ -13318,13 +12934,6 @@
   <p:clrMapOvr>
     <a:masterClrMapping/>
   </p:clrMapOvr>
-  <p:timing>
-    <p:tnLst>
-      <p:par>
-        <p:cTn id="1" dur="indefinite" restart="never" nodeType="tmRoot"/>
-      </p:par>
-    </p:tnLst>
-  </p:timing>
 </p:sld>
 </file>
 
@@ -13361,10 +12970,9 @@
           <a:lstStyle/>
           <a:p>
             <a:r>
-              <a:rPr lang="it-IT" dirty="0" smtClean="0"/>
+              <a:rPr lang="it-IT" dirty="0"/>
               <a:t>Motivazioni</a:t>
             </a:r>
-            <a:endParaRPr lang="it-IT" dirty="0"/>
           </a:p>
         </p:txBody>
       </p:sp>
@@ -13410,7 +13018,7 @@
               <a:t> di rilevamento automatico di mass </a:t>
             </a:r>
             <a:r>
-              <a:rPr lang="it-IT" dirty="0" err="1" smtClean="0">
+              <a:rPr lang="it-IT" dirty="0" err="1">
                 <a:latin typeface="Fira Sans Light" panose="020B0604020202020204" charset="0"/>
               </a:rPr>
               <a:t>assignment</a:t>
@@ -13445,11 +13053,11 @@
               <a:buNone/>
             </a:pPr>
             <a:r>
-              <a:rPr lang="it-IT" dirty="0" smtClean="0"/>
+              <a:rPr lang="it-IT" dirty="0"/>
               <a:t>Garantire la conformità di un’applicazione rispetto alle pratiche di sicurezza da adottare per mass </a:t>
             </a:r>
             <a:r>
-              <a:rPr lang="it-IT" dirty="0" err="1" smtClean="0"/>
+              <a:rPr lang="it-IT" dirty="0" err="1"/>
               <a:t>assignment</a:t>
             </a:r>
             <a:endParaRPr lang="it-IT" dirty="0"/>
@@ -13480,18 +13088,17 @@
               <a:buNone/>
             </a:pPr>
             <a:r>
-              <a:rPr lang="it-IT" dirty="0" smtClean="0"/>
+              <a:rPr lang="it-IT" dirty="0"/>
               <a:t>Migliorare la comprensione della vulnerabilità al mass </a:t>
             </a:r>
             <a:r>
-              <a:rPr lang="it-IT" dirty="0" err="1" smtClean="0"/>
+              <a:rPr lang="it-IT" dirty="0" err="1"/>
               <a:t>assignment</a:t>
             </a:r>
             <a:r>
-              <a:rPr lang="it-IT" dirty="0" smtClean="0"/>
+              <a:rPr lang="it-IT" dirty="0"/>
               <a:t> e contribuire alla ricerca nell’ambito della sicurezza delle REST API</a:t>
             </a:r>
-            <a:endParaRPr lang="it-IT" dirty="0"/>
           </a:p>
         </p:txBody>
       </p:sp>
@@ -16225,13 +15832,6 @@
   <p:clrMapOvr>
     <a:masterClrMapping/>
   </p:clrMapOvr>
-  <p:timing>
-    <p:tnLst>
-      <p:par>
-        <p:cTn id="1" dur="indefinite" restart="never" nodeType="tmRoot"/>
-      </p:par>
-    </p:tnLst>
-  </p:timing>
 </p:sld>
 </file>
 
@@ -16287,7 +15887,7 @@
               <a:buNone/>
             </a:pPr>
             <a:r>
-              <a:rPr lang="en" dirty="0" smtClean="0"/>
+              <a:rPr lang="en" dirty="0"/>
               <a:t>Indagine sullo stato dell’arte delle REST API </a:t>
             </a:r>
             <a:endParaRPr dirty="0"/>
@@ -16365,13 +15965,6 @@
   <p:clrMapOvr>
     <a:masterClrMapping/>
   </p:clrMapOvr>
-  <p:timing>
-    <p:tnLst>
-      <p:par>
-        <p:cTn id="1" dur="indefinite" restart="never" nodeType="tmRoot"/>
-      </p:par>
-    </p:tnLst>
-  </p:timing>
 </p:sld>
 </file>
 
@@ -16441,10 +16034,9 @@
           <a:lstStyle/>
           <a:p>
             <a:r>
-              <a:rPr lang="it-IT" dirty="0" smtClean="0"/>
+              <a:rPr lang="it-IT" dirty="0"/>
               <a:t>Linguaggi di programmazione più popolari</a:t>
             </a:r>
-            <a:endParaRPr lang="it-IT" dirty="0"/>
           </a:p>
         </p:txBody>
       </p:sp>
@@ -16490,13 +16082,6 @@
   <p:clrMapOvr>
     <a:masterClrMapping/>
   </p:clrMapOvr>
-  <p:timing>
-    <p:tnLst>
-      <p:par>
-        <p:cTn id="1" dur="indefinite" restart="never" nodeType="tmRoot"/>
-      </p:par>
-    </p:tnLst>
-  </p:timing>
 </p:sld>
 </file>
 
@@ -16552,7 +16137,7 @@
               <a:buNone/>
             </a:pPr>
             <a:r>
-              <a:rPr lang="en" dirty="0" smtClean="0"/>
+              <a:rPr lang="en" dirty="0"/>
               <a:t>Framework di programmazione più utilizzati</a:t>
             </a:r>
             <a:endParaRPr dirty="0"/>
@@ -16663,7 +16248,7 @@
                         <a:buNone/>
                       </a:pPr>
                       <a:r>
-                        <a:rPr lang="it-IT" sz="1400" dirty="0" smtClean="0">
+                        <a:rPr lang="it-IT" sz="1400" dirty="0">
                           <a:solidFill>
                             <a:schemeClr val="lt1"/>
                           </a:solidFill>
@@ -16750,7 +16335,7 @@
                         <a:buNone/>
                       </a:pPr>
                       <a:r>
-                        <a:rPr lang="en" sz="1400" b="0" dirty="0" smtClean="0">
+                        <a:rPr lang="en" sz="1400" b="0" dirty="0">
                           <a:solidFill>
                             <a:schemeClr val="lt1"/>
                           </a:solidFill>
@@ -16837,7 +16422,7 @@
                         <a:buNone/>
                       </a:pPr>
                       <a:r>
-                        <a:rPr lang="it-IT" sz="1400" smtClean="0">
+                        <a:rPr lang="it-IT" sz="1400">
                           <a:solidFill>
                             <a:schemeClr val="lt1"/>
                           </a:solidFill>
@@ -16934,7 +16519,7 @@
                         <a:buNone/>
                       </a:pPr>
                       <a:r>
-                        <a:rPr lang="en" sz="1800" dirty="0" smtClean="0">
+                        <a:rPr lang="en" sz="1800" dirty="0">
                           <a:solidFill>
                             <a:schemeClr val="dk1"/>
                           </a:solidFill>
@@ -17012,7 +16597,7 @@
                         <a:buNone/>
                       </a:pPr>
                       <a:r>
-                        <a:rPr lang="en" sz="1400" dirty="0" smtClean="0">
+                        <a:rPr lang="en" sz="1400" dirty="0">
                           <a:solidFill>
                             <a:schemeClr val="dk1"/>
                           </a:solidFill>
@@ -17097,7 +16682,7 @@
                         <a:buNone/>
                       </a:pPr>
                       <a:r>
-                        <a:rPr lang="en" sz="1400" dirty="0" smtClean="0">
+                        <a:rPr lang="en" sz="1400" dirty="0">
                           <a:solidFill>
                             <a:schemeClr val="dk1"/>
                           </a:solidFill>
@@ -17190,7 +16775,7 @@
                         <a:buFont typeface="Arial"/>
                         <a:buNone/>
                       </a:pPr>
-                      <a:endParaRPr sz="1000" dirty="0" smtClean="0">
+                      <a:endParaRPr sz="1000" dirty="0">
                         <a:solidFill>
                           <a:schemeClr val="dk1"/>
                         </a:solidFill>
@@ -17260,7 +16845,7 @@
                         <a:buNone/>
                       </a:pPr>
                       <a:r>
-                        <a:rPr lang="it-IT" sz="1400" dirty="0" err="1" smtClean="0">
+                        <a:rPr lang="it-IT" sz="1400" dirty="0" err="1">
                           <a:solidFill>
                             <a:schemeClr val="dk1"/>
                           </a:solidFill>
@@ -17345,7 +16930,7 @@
                         <a:buNone/>
                       </a:pPr>
                       <a:r>
-                        <a:rPr lang="en" sz="1400" dirty="0" smtClean="0">
+                        <a:rPr lang="en" sz="1400" dirty="0">
                           <a:solidFill>
                             <a:schemeClr val="dk1"/>
                           </a:solidFill>
@@ -17442,7 +17027,7 @@
                         <a:buNone/>
                       </a:pPr>
                       <a:r>
-                        <a:rPr lang="it-IT" sz="1800" dirty="0" smtClean="0">
+                        <a:rPr lang="it-IT" sz="1800" dirty="0">
                           <a:solidFill>
                             <a:schemeClr val="dk1"/>
                           </a:solidFill>
@@ -17529,7 +17114,7 @@
                         <a:buNone/>
                       </a:pPr>
                       <a:r>
-                        <a:rPr lang="en" sz="1400" dirty="0" smtClean="0">
+                        <a:rPr lang="en" sz="1400" dirty="0">
                           <a:solidFill>
                             <a:schemeClr val="dk1"/>
                           </a:solidFill>
@@ -17614,7 +17199,7 @@
                         <a:buNone/>
                       </a:pPr>
                       <a:r>
-                        <a:rPr lang="en" sz="1400" dirty="0" smtClean="0">
+                        <a:rPr lang="en" sz="1400" dirty="0">
                           <a:solidFill>
                             <a:schemeClr val="dk1"/>
                           </a:solidFill>
@@ -17777,7 +17362,7 @@
                         <a:buNone/>
                       </a:pPr>
                       <a:r>
-                        <a:rPr lang="en" sz="1400" dirty="0" smtClean="0">
+                        <a:rPr lang="en" sz="1400" dirty="0">
                           <a:solidFill>
                             <a:schemeClr val="dk1"/>
                           </a:solidFill>
@@ -17860,7 +17445,7 @@
                         <a:buNone/>
                       </a:pPr>
                       <a:r>
-                        <a:rPr lang="en" sz="1400" dirty="0" smtClean="0">
+                        <a:rPr lang="en" sz="1400" dirty="0">
                           <a:solidFill>
                             <a:schemeClr val="dk1"/>
                           </a:solidFill>
@@ -18021,7 +17606,7 @@
                         <a:buNone/>
                       </a:pPr>
                       <a:r>
-                        <a:rPr lang="en" sz="1400" dirty="0" smtClean="0">
+                        <a:rPr lang="en" sz="1400" dirty="0">
                           <a:solidFill>
                             <a:schemeClr val="dk1"/>
                           </a:solidFill>
@@ -18104,7 +17689,7 @@
                         <a:buNone/>
                       </a:pPr>
                       <a:r>
-                        <a:rPr lang="en" sz="1400" dirty="0" smtClean="0">
+                        <a:rPr lang="en" sz="1400" dirty="0">
                           <a:solidFill>
                             <a:schemeClr val="dk1"/>
                           </a:solidFill>
@@ -18265,7 +17850,7 @@
                         <a:buNone/>
                       </a:pPr>
                       <a:r>
-                        <a:rPr lang="en" sz="1400" dirty="0" smtClean="0">
+                        <a:rPr lang="en" sz="1400" dirty="0">
                           <a:solidFill>
                             <a:schemeClr val="dk1"/>
                           </a:solidFill>
@@ -18350,7 +17935,7 @@
                         <a:buNone/>
                       </a:pPr>
                       <a:r>
-                        <a:rPr lang="en" sz="1400" dirty="0" smtClean="0">
+                        <a:rPr lang="en" sz="1400" dirty="0">
                           <a:solidFill>
                             <a:schemeClr val="dk1"/>
                           </a:solidFill>
@@ -18447,7 +18032,7 @@
                         <a:buNone/>
                       </a:pPr>
                       <a:r>
-                        <a:rPr lang="it-IT" sz="1800" dirty="0" smtClean="0">
+                        <a:rPr lang="it-IT" sz="1800" dirty="0">
                           <a:solidFill>
                             <a:schemeClr val="dk1"/>
                           </a:solidFill>
@@ -18534,7 +18119,7 @@
                         <a:buNone/>
                       </a:pPr>
                       <a:r>
-                        <a:rPr lang="it-IT" sz="1400" dirty="0" err="1" smtClean="0">
+                        <a:rPr lang="it-IT" sz="1400" dirty="0" err="1">
                           <a:solidFill>
                             <a:schemeClr val="dk1"/>
                           </a:solidFill>
@@ -18619,7 +18204,7 @@
                         <a:buNone/>
                       </a:pPr>
                       <a:r>
-                        <a:rPr lang="it-IT" sz="1400" dirty="0" smtClean="0">
+                        <a:rPr lang="it-IT" sz="1400" dirty="0">
                           <a:solidFill>
                             <a:schemeClr val="dk1"/>
                           </a:solidFill>
@@ -18782,7 +18367,7 @@
                         <a:buNone/>
                       </a:pPr>
                       <a:r>
-                        <a:rPr lang="it-IT" sz="1400" dirty="0" err="1" smtClean="0">
+                        <a:rPr lang="it-IT" sz="1400" dirty="0" err="1">
                           <a:solidFill>
                             <a:schemeClr val="dk1"/>
                           </a:solidFill>
@@ -18865,7 +18450,7 @@
                         <a:buNone/>
                       </a:pPr>
                       <a:r>
-                        <a:rPr lang="it-IT" sz="1400" dirty="0" smtClean="0">
+                        <a:rPr lang="it-IT" sz="1400" dirty="0">
                           <a:solidFill>
                             <a:schemeClr val="dk1"/>
                           </a:solidFill>
@@ -19026,7 +18611,7 @@
                         <a:buNone/>
                       </a:pPr>
                       <a:r>
-                        <a:rPr lang="it-IT" sz="1400" dirty="0" err="1" smtClean="0">
+                        <a:rPr lang="it-IT" sz="1400" dirty="0" err="1">
                           <a:solidFill>
                             <a:schemeClr val="dk1"/>
                           </a:solidFill>
@@ -19109,7 +18694,7 @@
                         <a:buNone/>
                       </a:pPr>
                       <a:r>
-                        <a:rPr lang="it-IT" sz="1400" dirty="0" smtClean="0">
+                        <a:rPr lang="it-IT" sz="1400" dirty="0">
                           <a:solidFill>
                             <a:schemeClr val="dk1"/>
                           </a:solidFill>
@@ -19270,7 +18855,7 @@
                         <a:buNone/>
                       </a:pPr>
                       <a:r>
-                        <a:rPr lang="it-IT" sz="1400" dirty="0" smtClean="0">
+                        <a:rPr lang="it-IT" sz="1400" dirty="0">
                           <a:solidFill>
                             <a:schemeClr val="dk1"/>
                           </a:solidFill>
@@ -19355,7 +18940,7 @@
                         <a:buNone/>
                       </a:pPr>
                       <a:r>
-                        <a:rPr lang="it-IT" sz="1400" dirty="0" smtClean="0">
+                        <a:rPr lang="it-IT" sz="1400" dirty="0">
                           <a:solidFill>
                             <a:schemeClr val="dk1"/>
                           </a:solidFill>
@@ -19442,13 +19027,6 @@
   <p:clrMapOvr>
     <a:masterClrMapping/>
   </p:clrMapOvr>
-  <p:timing>
-    <p:tnLst>
-      <p:par>
-        <p:cTn id="1" dur="indefinite" restart="never" nodeType="tmRoot"/>
-      </p:par>
-    </p:tnLst>
-  </p:timing>
 </p:sld>
 </file>
 

</xml_diff>